<commit_message>
fixed code to read from db correctly. added first unit test. added page abstraction as example for webdriver test
</commit_message>
<xml_diff>
--- a/prog_java_talk.pptx
+++ b/prog_java_talk.pptx
@@ -229,7 +229,7 @@
             <a:fld id="{F81C8D4E-8367-8C4C-9015-BC64B4790744}" type="datetimeFigureOut">
               <a:rPr lang="en-US" smtClean="0"/>
               <a:pPr/>
-              <a:t>4/29/12</a:t>
+              <a:t>5/1/12</a:t>
             </a:fld>
             <a:endParaRPr lang="en-US"/>
           </a:p>
@@ -2333,7 +2333,7 @@
             <a:fld id="{E45F1A74-341F-4B40-ACEC-51B6F7F364D6}" type="datetimeFigureOut">
               <a:rPr lang="en-US" smtClean="0"/>
               <a:pPr/>
-              <a:t>4/29/12</a:t>
+              <a:t>5/1/12</a:t>
             </a:fld>
             <a:endParaRPr lang="en-US"/>
           </a:p>
@@ -2500,7 +2500,7 @@
             <a:fld id="{E45F1A74-341F-4B40-ACEC-51B6F7F364D6}" type="datetimeFigureOut">
               <a:rPr lang="en-US" smtClean="0"/>
               <a:pPr/>
-              <a:t>4/29/12</a:t>
+              <a:t>5/1/12</a:t>
             </a:fld>
             <a:endParaRPr lang="en-US"/>
           </a:p>
@@ -2677,7 +2677,7 @@
             <a:fld id="{E45F1A74-341F-4B40-ACEC-51B6F7F364D6}" type="datetimeFigureOut">
               <a:rPr lang="en-US" smtClean="0"/>
               <a:pPr/>
-              <a:t>4/29/12</a:t>
+              <a:t>5/1/12</a:t>
             </a:fld>
             <a:endParaRPr lang="en-US"/>
           </a:p>
@@ -2775,7 +2775,7 @@
                 </a:solidFill>
               </a:rPr>
               <a:pPr/>
-              <a:t>4/29/12</a:t>
+              <a:t>5/1/12</a:t>
             </a:fld>
             <a:endParaRPr lang="en-US">
               <a:solidFill>
@@ -2972,7 +2972,7 @@
                 </a:solidFill>
               </a:rPr>
               <a:pPr/>
-              <a:t>4/29/12</a:t>
+              <a:t>5/1/12</a:t>
             </a:fld>
             <a:endParaRPr lang="en-US">
               <a:solidFill>
@@ -3169,7 +3169,7 @@
                 </a:solidFill>
               </a:rPr>
               <a:pPr/>
-              <a:t>4/29/12</a:t>
+              <a:t>5/1/12</a:t>
             </a:fld>
             <a:endParaRPr lang="en-US">
               <a:solidFill>
@@ -3291,7 +3291,7 @@
                 </a:solidFill>
               </a:rPr>
               <a:pPr/>
-              <a:t>4/29/12</a:t>
+              <a:t>5/1/12</a:t>
             </a:fld>
             <a:endParaRPr lang="en-US">
               <a:solidFill>
@@ -3482,7 +3482,7 @@
             <a:fld id="{E45F1A74-341F-4B40-ACEC-51B6F7F364D6}" type="datetimeFigureOut">
               <a:rPr lang="en-US" smtClean="0"/>
               <a:pPr/>
-              <a:t>4/29/12</a:t>
+              <a:t>5/1/12</a:t>
             </a:fld>
             <a:endParaRPr lang="en-US"/>
           </a:p>
@@ -3725,7 +3725,7 @@
             <a:fld id="{E45F1A74-341F-4B40-ACEC-51B6F7F364D6}" type="datetimeFigureOut">
               <a:rPr lang="en-US" smtClean="0"/>
               <a:pPr/>
-              <a:t>4/29/12</a:t>
+              <a:t>5/1/12</a:t>
             </a:fld>
             <a:endParaRPr lang="en-US"/>
           </a:p>
@@ -4010,7 +4010,7 @@
             <a:fld id="{E45F1A74-341F-4B40-ACEC-51B6F7F364D6}" type="datetimeFigureOut">
               <a:rPr lang="en-US" smtClean="0"/>
               <a:pPr/>
-              <a:t>4/29/12</a:t>
+              <a:t>5/1/12</a:t>
             </a:fld>
             <a:endParaRPr lang="en-US"/>
           </a:p>
@@ -4429,7 +4429,7 @@
             <a:fld id="{E45F1A74-341F-4B40-ACEC-51B6F7F364D6}" type="datetimeFigureOut">
               <a:rPr lang="en-US" smtClean="0"/>
               <a:pPr/>
-              <a:t>4/29/12</a:t>
+              <a:t>5/1/12</a:t>
             </a:fld>
             <a:endParaRPr lang="en-US"/>
           </a:p>
@@ -4544,7 +4544,7 @@
             <a:fld id="{E45F1A74-341F-4B40-ACEC-51B6F7F364D6}" type="datetimeFigureOut">
               <a:rPr lang="en-US" smtClean="0"/>
               <a:pPr/>
-              <a:t>4/29/12</a:t>
+              <a:t>5/1/12</a:t>
             </a:fld>
             <a:endParaRPr lang="en-US"/>
           </a:p>
@@ -4636,7 +4636,7 @@
             <a:fld id="{E45F1A74-341F-4B40-ACEC-51B6F7F364D6}" type="datetimeFigureOut">
               <a:rPr lang="en-US" smtClean="0"/>
               <a:pPr/>
-              <a:t>4/29/12</a:t>
+              <a:t>5/1/12</a:t>
             </a:fld>
             <a:endParaRPr lang="en-US"/>
           </a:p>
@@ -4910,7 +4910,7 @@
             <a:fld id="{E45F1A74-341F-4B40-ACEC-51B6F7F364D6}" type="datetimeFigureOut">
               <a:rPr lang="en-US" smtClean="0"/>
               <a:pPr/>
-              <a:t>4/29/12</a:t>
+              <a:t>5/1/12</a:t>
             </a:fld>
             <a:endParaRPr lang="en-US"/>
           </a:p>
@@ -5160,7 +5160,7 @@
             <a:fld id="{E45F1A74-341F-4B40-ACEC-51B6F7F364D6}" type="datetimeFigureOut">
               <a:rPr lang="en-US" smtClean="0"/>
               <a:pPr/>
-              <a:t>4/29/12</a:t>
+              <a:t>5/1/12</a:t>
             </a:fld>
             <a:endParaRPr lang="en-US"/>
           </a:p>
@@ -5373,7 +5373,7 @@
             <a:fld id="{E45F1A74-341F-4B40-ACEC-51B6F7F364D6}" type="datetimeFigureOut">
               <a:rPr lang="en-US" smtClean="0"/>
               <a:pPr/>
-              <a:t>4/29/12</a:t>
+              <a:t>5/1/12</a:t>
             </a:fld>
             <a:endParaRPr lang="en-US"/>
           </a:p>
@@ -5889,7 +5889,7 @@
                 </a:solidFill>
               </a:rPr>
               <a:pPr/>
-              <a:t>4/29/12</a:t>
+              <a:t>5/1/12</a:t>
             </a:fld>
             <a:endParaRPr lang="en-US">
               <a:solidFill>
@@ -6419,7 +6419,7 @@
                 </a:solidFill>
               </a:rPr>
               <a:pPr/>
-              <a:t>4/29/12</a:t>
+              <a:t>5/1/12</a:t>
             </a:fld>
             <a:endParaRPr lang="en-US">
               <a:solidFill>
@@ -6949,7 +6949,7 @@
                 </a:solidFill>
               </a:rPr>
               <a:pPr/>
-              <a:t>4/29/12</a:t>
+              <a:t>5/1/12</a:t>
             </a:fld>
             <a:endParaRPr lang="en-US">
               <a:solidFill>
@@ -7479,7 +7479,7 @@
                 </a:solidFill>
               </a:rPr>
               <a:pPr/>
-              <a:t>4/29/12</a:t>
+              <a:t>5/1/12</a:t>
             </a:fld>
             <a:endParaRPr lang="en-US">
               <a:solidFill>
@@ -8253,21 +8253,8 @@
                   <a:srgbClr val="FFFFFF"/>
                 </a:solidFill>
               </a:rPr>
-              <a:t>https://github.com/signup/</a:t>
+              <a:t>https://github.com/signup/free</a:t>
             </a:r>
-            <a:r>
-              <a:rPr lang="en-US" sz="2800" b="1" dirty="0" smtClean="0">
-                <a:solidFill>
-                  <a:srgbClr val="FFFFFF"/>
-                </a:solidFill>
-              </a:rPr>
-              <a:t>free</a:t>
-            </a:r>
-            <a:endParaRPr lang="en-US" sz="2800" b="1" dirty="0" smtClean="0">
-              <a:solidFill>
-                <a:srgbClr val="FFFFFF"/>
-              </a:solidFill>
-            </a:endParaRPr>
           </a:p>
           <a:p>
             <a:r>
@@ -8276,15 +8263,7 @@
                   <a:srgbClr val="FFFFFF"/>
                 </a:solidFill>
               </a:rPr>
-              <a:t>http</a:t>
-            </a:r>
-            <a:r>
-              <a:rPr lang="en-US" sz="2800" b="1" dirty="0" err="1" smtClean="0">
-                <a:solidFill>
-                  <a:srgbClr val="FFFFFF"/>
-                </a:solidFill>
-              </a:rPr>
-              <a:t>://help.github.com/mac-set-up-git</a:t>
+              <a:t>http://help.github.com/mac-set-up-git</a:t>
             </a:r>
             <a:r>
               <a:rPr lang="en-US" sz="2800" b="1" dirty="0" smtClean="0">
@@ -8294,11 +8273,6 @@
               </a:rPr>
               <a:t>/</a:t>
             </a:r>
-            <a:endParaRPr lang="en-US" sz="2800" b="1" dirty="0" smtClean="0">
-              <a:solidFill>
-                <a:srgbClr val="FFFFFF"/>
-              </a:solidFill>
-            </a:endParaRPr>
           </a:p>
           <a:p>
             <a:r>
@@ -8569,15 +8543,7 @@
                   <a:schemeClr val="bg1"/>
                 </a:solidFill>
               </a:rPr>
-              <a:t>git@github.com:akash/story-</a:t>
-            </a:r>
-            <a:r>
-              <a:rPr lang="en-US" sz="2800" b="1" dirty="0" err="1" smtClean="0">
-                <a:solidFill>
-                  <a:schemeClr val="bg1"/>
-                </a:solidFill>
-              </a:rPr>
-              <a:t>wall.git</a:t>
+              <a:t>git@github.com:akash/story-wall.git</a:t>
             </a:r>
             <a:endParaRPr lang="en-US" sz="2800" b="1" dirty="0" smtClean="0">
               <a:solidFill>
@@ -8779,15 +8745,7 @@
                   <a:srgbClr val="FFFFFF"/>
                 </a:solidFill>
               </a:rPr>
-              <a:t>www.mongodb.org/display/DOCS/Quickstart+OS+</a:t>
-            </a:r>
-            <a:r>
-              <a:rPr lang="en-US" sz="2800" b="1" dirty="0" err="1" smtClean="0">
-                <a:solidFill>
-                  <a:srgbClr val="FFFFFF"/>
-                </a:solidFill>
-              </a:rPr>
-              <a:t>X</a:t>
+              <a:t>www.mongodb.org/display/DOCS/Quickstart+OS+X</a:t>
             </a:r>
             <a:endParaRPr lang="en-US" sz="2800" b="1" dirty="0" smtClean="0">
               <a:solidFill>
@@ -12893,11 +12851,6 @@
               </a:rPr>
               <a:t>Story wall</a:t>
             </a:r>
-            <a:endParaRPr lang="en-US" sz="2800" b="1" dirty="0" smtClean="0">
-              <a:solidFill>
-                <a:prstClr val="black"/>
-              </a:solidFill>
-            </a:endParaRPr>
           </a:p>
         </p:txBody>
       </p:sp>
@@ -17818,15 +17771,7 @@
                   <a:srgbClr val="FFFFFF"/>
                 </a:solidFill>
               </a:rPr>
-              <a:t>/</a:t>
-            </a:r>
-            <a:r>
-              <a:rPr lang="en-US" sz="2000" dirty="0" smtClean="0">
-                <a:solidFill>
-                  <a:srgbClr val="FFFFFF"/>
-                </a:solidFill>
-              </a:rPr>
-              <a:t>blog</a:t>
+              <a:t>/blog</a:t>
             </a:r>
           </a:p>
           <a:p>
@@ -22130,11 +22075,6 @@
               </a:rPr>
               <a:t>New Story</a:t>
             </a:r>
-            <a:endParaRPr lang="en-US" sz="2800" b="1" dirty="0" smtClean="0">
-              <a:solidFill>
-                <a:prstClr val="black"/>
-              </a:solidFill>
-            </a:endParaRPr>
           </a:p>
         </p:txBody>
       </p:sp>
@@ -22370,6 +22310,13 @@
   <p:clrMapOvr>
     <a:masterClrMapping/>
   </p:clrMapOvr>
+  <p:timing>
+    <p:tnLst>
+      <p:par>
+        <p:cTn id="1" dur="indefinite" restart="never" nodeType="tmRoot"/>
+      </p:par>
+    </p:tnLst>
+  </p:timing>
 </p:sld>
 </file>
 
@@ -38921,6 +38868,13 @@
   <p:clrMapOvr>
     <a:masterClrMapping/>
   </p:clrMapOvr>
+  <p:timing>
+    <p:tnLst>
+      <p:par>
+        <p:cTn id="1" dur="indefinite" restart="never" nodeType="tmRoot"/>
+      </p:par>
+    </p:tnLst>
+  </p:timing>
 </p:sld>
 </file>
 
@@ -39120,6 +39074,13 @@
   <p:clrMapOvr>
     <a:masterClrMapping/>
   </p:clrMapOvr>
+  <p:timing>
+    <p:tnLst>
+      <p:par>
+        <p:cTn id="1" dur="indefinite" restart="never" nodeType="tmRoot"/>
+      </p:par>
+    </p:tnLst>
+  </p:timing>
 </p:sld>
 </file>
 
@@ -40350,8 +40311,8 @@
           </p:cNvPicPr>
           <p:nvPr/>
         </p:nvPicPr>
-        <mc:AlternateContent xmlns:ma="http://schemas.microsoft.com/office/mac/drawingml/2008/main">
-          <mc:Choice Requires="ma">
+        <mc:AlternateContent>
+          <mc:Choice xmlns:ma="http://schemas.microsoft.com/office/mac/drawingml/2008/main" Requires="ma">
             <p:blipFill>
               <a:blip r:embed="rId2"/>
               <a:stretch>
@@ -40359,7 +40320,7 @@
               </a:stretch>
             </p:blipFill>
           </mc:Choice>
-          <mc:Fallback xmlns:p="http://schemas.openxmlformats.org/presentationml/2006/main" xmlns:mv="urn:schemas-microsoft-com:mac:vml" xmlns:mc="http://schemas.openxmlformats.org/markup-compatibility/2006" xmlns:r="http://schemas.openxmlformats.org/officeDocument/2006/relationships" xmlns:a="http://schemas.openxmlformats.org/drawingml/2006/main" xmlns="">
+          <mc:Fallback>
             <p:blipFill>
               <a:blip r:embed="rId3"/>
               <a:stretch>
@@ -40397,7 +40358,7 @@
           </mc:Choice>
           <mc:Fallback>
             <p:blipFill>
-              <a:blip r:embed="rId4"/>
+              <a:blip r:embed="rId3"/>
               <a:stretch>
                 <a:fillRect/>
               </a:stretch>
@@ -40422,8 +40383,8 @@
           </p:cNvPicPr>
           <p:nvPr/>
         </p:nvPicPr>
-        <mc:AlternateContent xmlns:ma="http://schemas.microsoft.com/office/mac/drawingml/2008/main">
-          <mc:Choice Requires="ma">
+        <mc:AlternateContent>
+          <mc:Choice xmlns:ma="http://schemas.microsoft.com/office/mac/drawingml/2008/main" Requires="ma">
             <p:blipFill>
               <a:blip r:embed="rId2"/>
               <a:stretch>
@@ -40431,7 +40392,7 @@
               </a:stretch>
             </p:blipFill>
           </mc:Choice>
-          <mc:Fallback xmlns:p="http://schemas.openxmlformats.org/presentationml/2006/main" xmlns:mv="urn:schemas-microsoft-com:mac:vml" xmlns:mc="http://schemas.openxmlformats.org/markup-compatibility/2006" xmlns:r="http://schemas.openxmlformats.org/officeDocument/2006/relationships" xmlns:a="http://schemas.openxmlformats.org/drawingml/2006/main" xmlns="">
+          <mc:Fallback>
             <p:blipFill>
               <a:blip r:embed="rId3"/>
               <a:stretch>
@@ -40458,8 +40419,8 @@
           </p:cNvPicPr>
           <p:nvPr/>
         </p:nvPicPr>
-        <mc:AlternateContent xmlns:ma="http://schemas.microsoft.com/office/mac/drawingml/2008/main">
-          <mc:Choice Requires="ma">
+        <mc:AlternateContent>
+          <mc:Choice xmlns:ma="http://schemas.microsoft.com/office/mac/drawingml/2008/main" Requires="ma">
             <p:blipFill>
               <a:blip r:embed="rId2"/>
               <a:stretch>
@@ -40467,7 +40428,7 @@
               </a:stretch>
             </p:blipFill>
           </mc:Choice>
-          <mc:Fallback xmlns:p="http://schemas.openxmlformats.org/presentationml/2006/main" xmlns:mv="urn:schemas-microsoft-com:mac:vml" xmlns:mc="http://schemas.openxmlformats.org/markup-compatibility/2006" xmlns:r="http://schemas.openxmlformats.org/officeDocument/2006/relationships" xmlns:a="http://schemas.openxmlformats.org/drawingml/2006/main" xmlns="">
+          <mc:Fallback>
             <p:blipFill>
               <a:blip r:embed="rId3"/>
               <a:stretch>
@@ -40494,8 +40455,8 @@
           </p:cNvPicPr>
           <p:nvPr/>
         </p:nvPicPr>
-        <mc:AlternateContent xmlns:ma="http://schemas.microsoft.com/office/mac/drawingml/2008/main">
-          <mc:Choice Requires="ma">
+        <mc:AlternateContent>
+          <mc:Choice xmlns:ma="http://schemas.microsoft.com/office/mac/drawingml/2008/main" Requires="ma">
             <p:blipFill>
               <a:blip r:embed="rId2"/>
               <a:stretch>
@@ -40503,7 +40464,7 @@
               </a:stretch>
             </p:blipFill>
           </mc:Choice>
-          <mc:Fallback xmlns:p="http://schemas.openxmlformats.org/presentationml/2006/main" xmlns:mv="urn:schemas-microsoft-com:mac:vml" xmlns:mc="http://schemas.openxmlformats.org/markup-compatibility/2006" xmlns:r="http://schemas.openxmlformats.org/officeDocument/2006/relationships" xmlns:a="http://schemas.openxmlformats.org/drawingml/2006/main" xmlns="">
+          <mc:Fallback>
             <p:blipFill>
               <a:blip r:embed="rId3"/>
               <a:stretch>
@@ -40530,8 +40491,8 @@
           </p:cNvPicPr>
           <p:nvPr/>
         </p:nvPicPr>
-        <mc:AlternateContent xmlns:ma="http://schemas.microsoft.com/office/mac/drawingml/2008/main">
-          <mc:Choice Requires="ma">
+        <mc:AlternateContent>
+          <mc:Choice xmlns:ma="http://schemas.microsoft.com/office/mac/drawingml/2008/main" Requires="ma">
             <p:blipFill>
               <a:blip r:embed="rId2"/>
               <a:stretch>
@@ -40539,7 +40500,7 @@
               </a:stretch>
             </p:blipFill>
           </mc:Choice>
-          <mc:Fallback xmlns:p="http://schemas.openxmlformats.org/presentationml/2006/main" xmlns:mv="urn:schemas-microsoft-com:mac:vml" xmlns:mc="http://schemas.openxmlformats.org/markup-compatibility/2006" xmlns:r="http://schemas.openxmlformats.org/officeDocument/2006/relationships" xmlns:a="http://schemas.openxmlformats.org/drawingml/2006/main" xmlns="">
+          <mc:Fallback>
             <p:blipFill>
               <a:blip r:embed="rId3"/>
               <a:stretch>
@@ -40566,8 +40527,8 @@
           </p:cNvPicPr>
           <p:nvPr/>
         </p:nvPicPr>
-        <mc:AlternateContent xmlns:ma="http://schemas.microsoft.com/office/mac/drawingml/2008/main">
-          <mc:Choice Requires="ma">
+        <mc:AlternateContent>
+          <mc:Choice xmlns:ma="http://schemas.microsoft.com/office/mac/drawingml/2008/main" Requires="ma">
             <p:blipFill>
               <a:blip r:embed="rId2"/>
               <a:stretch>
@@ -40575,7 +40536,7 @@
               </a:stretch>
             </p:blipFill>
           </mc:Choice>
-          <mc:Fallback xmlns:p="http://schemas.openxmlformats.org/presentationml/2006/main" xmlns:mv="urn:schemas-microsoft-com:mac:vml" xmlns:mc="http://schemas.openxmlformats.org/markup-compatibility/2006" xmlns:r="http://schemas.openxmlformats.org/officeDocument/2006/relationships" xmlns:a="http://schemas.openxmlformats.org/drawingml/2006/main" xmlns="">
+          <mc:Fallback>
             <p:blipFill>
               <a:blip r:embed="rId3"/>
               <a:stretch>
@@ -40602,8 +40563,8 @@
           </p:cNvPicPr>
           <p:nvPr/>
         </p:nvPicPr>
-        <mc:AlternateContent xmlns:ma="http://schemas.microsoft.com/office/mac/drawingml/2008/main">
-          <mc:Choice Requires="ma">
+        <mc:AlternateContent>
+          <mc:Choice xmlns:ma="http://schemas.microsoft.com/office/mac/drawingml/2008/main" Requires="ma">
             <p:blipFill>
               <a:blip r:embed="rId2"/>
               <a:stretch>
@@ -40611,7 +40572,7 @@
               </a:stretch>
             </p:blipFill>
           </mc:Choice>
-          <mc:Fallback xmlns:p="http://schemas.openxmlformats.org/presentationml/2006/main" xmlns:mv="urn:schemas-microsoft-com:mac:vml" xmlns:mc="http://schemas.openxmlformats.org/markup-compatibility/2006" xmlns:r="http://schemas.openxmlformats.org/officeDocument/2006/relationships" xmlns:a="http://schemas.openxmlformats.org/drawingml/2006/main" xmlns="">
+          <mc:Fallback>
             <p:blipFill>
               <a:blip r:embed="rId3"/>
               <a:stretch>
@@ -40638,8 +40599,8 @@
           </p:cNvPicPr>
           <p:nvPr/>
         </p:nvPicPr>
-        <mc:AlternateContent xmlns:ma="http://schemas.microsoft.com/office/mac/drawingml/2008/main">
-          <mc:Choice Requires="ma">
+        <mc:AlternateContent>
+          <mc:Choice xmlns:ma="http://schemas.microsoft.com/office/mac/drawingml/2008/main" Requires="ma">
             <p:blipFill>
               <a:blip r:embed="rId2"/>
               <a:stretch>
@@ -40647,7 +40608,7 @@
               </a:stretch>
             </p:blipFill>
           </mc:Choice>
-          <mc:Fallback xmlns:p="http://schemas.openxmlformats.org/presentationml/2006/main" xmlns:mv="urn:schemas-microsoft-com:mac:vml" xmlns:mc="http://schemas.openxmlformats.org/markup-compatibility/2006" xmlns:r="http://schemas.openxmlformats.org/officeDocument/2006/relationships" xmlns:a="http://schemas.openxmlformats.org/drawingml/2006/main" xmlns="">
+          <mc:Fallback>
             <p:blipFill>
               <a:blip r:embed="rId3"/>
               <a:stretch>
@@ -42124,21 +42085,8 @@
                   <a:schemeClr val="bg1"/>
                 </a:solidFill>
               </a:rPr>
-              <a:t> Introduce the technology required to complete</a:t>
+              <a:t> Introduce the technology required to complete story</a:t>
             </a:r>
-            <a:r>
-              <a:rPr lang="en-US" sz="2800" dirty="0" smtClean="0">
-                <a:solidFill>
-                  <a:schemeClr val="bg1"/>
-                </a:solidFill>
-              </a:rPr>
-              <a:t> story</a:t>
-            </a:r>
-            <a:endParaRPr lang="en-US" sz="2800" dirty="0" smtClean="0">
-              <a:solidFill>
-                <a:schemeClr val="bg1"/>
-              </a:solidFill>
-            </a:endParaRPr>
           </a:p>
           <a:p>
             <a:pPr>

</xml_diff>

<commit_message>
akash - updated slides
</commit_message>
<xml_diff>
--- a/prog_java_talk.pptx
+++ b/prog_java_talk.pptx
@@ -9,7 +9,7 @@
     <p:sldMasterId id="2147483666" r:id="rId5"/>
   </p:sldMasterIdLst>
   <p:notesMasterIdLst>
-    <p:notesMasterId r:id="rId39"/>
+    <p:notesMasterId r:id="rId40"/>
   </p:notesMasterIdLst>
   <p:sldIdLst>
     <p:sldId id="256" r:id="rId6"/>
@@ -17,34 +17,35 @@
     <p:sldId id="258" r:id="rId8"/>
     <p:sldId id="287" r:id="rId9"/>
     <p:sldId id="260" r:id="rId10"/>
-    <p:sldId id="261" r:id="rId11"/>
-    <p:sldId id="262" r:id="rId12"/>
-    <p:sldId id="291" r:id="rId13"/>
-    <p:sldId id="294" r:id="rId14"/>
-    <p:sldId id="292" r:id="rId15"/>
-    <p:sldId id="295" r:id="rId16"/>
-    <p:sldId id="293" r:id="rId17"/>
-    <p:sldId id="269" r:id="rId18"/>
-    <p:sldId id="296" r:id="rId19"/>
-    <p:sldId id="280" r:id="rId20"/>
-    <p:sldId id="283" r:id="rId21"/>
-    <p:sldId id="284" r:id="rId22"/>
-    <p:sldId id="285" r:id="rId23"/>
-    <p:sldId id="270" r:id="rId24"/>
-    <p:sldId id="273" r:id="rId25"/>
-    <p:sldId id="298" r:id="rId26"/>
-    <p:sldId id="274" r:id="rId27"/>
-    <p:sldId id="277" r:id="rId28"/>
-    <p:sldId id="275" r:id="rId29"/>
-    <p:sldId id="299" r:id="rId30"/>
-    <p:sldId id="271" r:id="rId31"/>
-    <p:sldId id="272" r:id="rId32"/>
-    <p:sldId id="286" r:id="rId33"/>
-    <p:sldId id="297" r:id="rId34"/>
-    <p:sldId id="301" r:id="rId35"/>
-    <p:sldId id="263" r:id="rId36"/>
-    <p:sldId id="300" r:id="rId37"/>
-    <p:sldId id="288" r:id="rId38"/>
+    <p:sldId id="302" r:id="rId11"/>
+    <p:sldId id="261" r:id="rId12"/>
+    <p:sldId id="262" r:id="rId13"/>
+    <p:sldId id="291" r:id="rId14"/>
+    <p:sldId id="294" r:id="rId15"/>
+    <p:sldId id="292" r:id="rId16"/>
+    <p:sldId id="295" r:id="rId17"/>
+    <p:sldId id="293" r:id="rId18"/>
+    <p:sldId id="269" r:id="rId19"/>
+    <p:sldId id="296" r:id="rId20"/>
+    <p:sldId id="280" r:id="rId21"/>
+    <p:sldId id="283" r:id="rId22"/>
+    <p:sldId id="284" r:id="rId23"/>
+    <p:sldId id="285" r:id="rId24"/>
+    <p:sldId id="270" r:id="rId25"/>
+    <p:sldId id="273" r:id="rId26"/>
+    <p:sldId id="298" r:id="rId27"/>
+    <p:sldId id="274" r:id="rId28"/>
+    <p:sldId id="277" r:id="rId29"/>
+    <p:sldId id="275" r:id="rId30"/>
+    <p:sldId id="299" r:id="rId31"/>
+    <p:sldId id="271" r:id="rId32"/>
+    <p:sldId id="272" r:id="rId33"/>
+    <p:sldId id="286" r:id="rId34"/>
+    <p:sldId id="297" r:id="rId35"/>
+    <p:sldId id="301" r:id="rId36"/>
+    <p:sldId id="263" r:id="rId37"/>
+    <p:sldId id="300" r:id="rId38"/>
+    <p:sldId id="288" r:id="rId39"/>
   </p:sldIdLst>
   <p:sldSz cx="9144000" cy="6858000" type="screen4x3"/>
   <p:notesSz cx="6858000" cy="9144000"/>
@@ -644,6 +645,159 @@
                 <a:ea typeface="+mn-ea"/>
                 <a:cs typeface="+mn-cs"/>
               </a:rPr>
+              <a:t>Consume the post data and create story in DB</a:t>
+            </a:r>
+          </a:p>
+          <a:p>
+            <a:pPr>
+              <a:buFontTx/>
+              <a:buNone/>
+            </a:pPr>
+            <a:endParaRPr lang="en-US" sz="1200" kern="1200" dirty="0" smtClean="0">
+              <a:solidFill>
+                <a:schemeClr val="tx1"/>
+              </a:solidFill>
+              <a:latin typeface="+mn-lt"/>
+              <a:ea typeface="+mn-ea"/>
+              <a:cs typeface="+mn-cs"/>
+            </a:endParaRPr>
+          </a:p>
+          <a:p>
+            <a:pPr>
+              <a:buFontTx/>
+              <a:buNone/>
+            </a:pPr>
+            <a:r>
+              <a:rPr lang="en-US" sz="1200" kern="1200" dirty="0" smtClean="0">
+                <a:solidFill>
+                  <a:schemeClr val="tx1"/>
+                </a:solidFill>
+                <a:latin typeface="+mn-lt"/>
+                <a:ea typeface="+mn-ea"/>
+                <a:cs typeface="+mn-cs"/>
+              </a:rPr>
+              <a:t>use Post-Redirect-Get</a:t>
+            </a:r>
+            <a:r>
+              <a:rPr lang="en-US" sz="1200" kern="1200" baseline="0" dirty="0" smtClean="0">
+                <a:solidFill>
+                  <a:schemeClr val="tx1"/>
+                </a:solidFill>
+                <a:latin typeface="+mn-lt"/>
+                <a:ea typeface="+mn-ea"/>
+                <a:cs typeface="+mn-cs"/>
+              </a:rPr>
+              <a:t> </a:t>
+            </a:r>
+            <a:r>
+              <a:rPr lang="en-US" sz="1200" kern="1200" dirty="0" smtClean="0">
+                <a:solidFill>
+                  <a:schemeClr val="tx1"/>
+                </a:solidFill>
+                <a:latin typeface="+mn-lt"/>
+                <a:ea typeface="+mn-ea"/>
+                <a:cs typeface="+mn-cs"/>
+              </a:rPr>
+              <a:t>to redirect user back to wall page after create</a:t>
+            </a:r>
+            <a:endParaRPr lang="en-US" dirty="0" smtClean="0"/>
+          </a:p>
+          <a:p>
+            <a:endParaRPr lang="en-US" dirty="0"/>
+          </a:p>
+        </p:txBody>
+      </p:sp>
+      <p:sp>
+        <p:nvSpPr>
+          <p:cNvPr id="4" name="Slide Number Placeholder 3"/>
+          <p:cNvSpPr>
+            <a:spLocks noGrp="1"/>
+          </p:cNvSpPr>
+          <p:nvPr>
+            <p:ph type="sldNum" sz="quarter" idx="10"/>
+          </p:nvPr>
+        </p:nvSpPr>
+        <p:spPr/>
+        <p:txBody>
+          <a:bodyPr/>
+          <a:lstStyle/>
+          <a:p>
+            <a:fld id="{E91D8FCE-2AFE-2844-95F7-FD897434AF0C}" type="slidenum">
+              <a:rPr lang="en-US" smtClean="0"/>
+              <a:pPr/>
+              <a:t>23</a:t>
+            </a:fld>
+            <a:endParaRPr lang="en-US"/>
+          </a:p>
+        </p:txBody>
+      </p:sp>
+    </p:spTree>
+  </p:cSld>
+  <p:clrMapOvr>
+    <a:masterClrMapping/>
+  </p:clrMapOvr>
+</p:notes>
+</file>
+
+<file path=ppt/notesSlides/notesSlide11.xml><?xml version="1.0" encoding="utf-8"?>
+<p:notes xmlns:a="http://schemas.openxmlformats.org/drawingml/2006/main" xmlns:r="http://schemas.openxmlformats.org/officeDocument/2006/relationships" xmlns:mc="http://schemas.openxmlformats.org/markup-compatibility/2006" xmlns:mv="urn:schemas-microsoft-com:mac:vml" xmlns:p="http://schemas.openxmlformats.org/presentationml/2006/main" mc:Ignorable="mv" mc:PreserveAttributes="mv:*">
+  <p:cSld>
+    <p:spTree>
+      <p:nvGrpSpPr>
+        <p:cNvPr id="1" name=""/>
+        <p:cNvGrpSpPr/>
+        <p:nvPr/>
+      </p:nvGrpSpPr>
+      <p:grpSpPr>
+        <a:xfrm>
+          <a:off x="0" y="0"/>
+          <a:ext cx="0" cy="0"/>
+          <a:chOff x="0" y="0"/>
+          <a:chExt cx="0" cy="0"/>
+        </a:xfrm>
+      </p:grpSpPr>
+      <p:sp>
+        <p:nvSpPr>
+          <p:cNvPr id="2" name="Slide Image Placeholder 1"/>
+          <p:cNvSpPr>
+            <a:spLocks noGrp="1" noRot="1" noChangeAspect="1"/>
+          </p:cNvSpPr>
+          <p:nvPr>
+            <p:ph type="sldImg"/>
+          </p:nvPr>
+        </p:nvSpPr>
+        <p:spPr/>
+      </p:sp>
+      <p:sp>
+        <p:nvSpPr>
+          <p:cNvPr id="3" name="Notes Placeholder 2"/>
+          <p:cNvSpPr>
+            <a:spLocks noGrp="1"/>
+          </p:cNvSpPr>
+          <p:nvPr>
+            <p:ph type="body" idx="1"/>
+          </p:nvPr>
+        </p:nvSpPr>
+        <p:spPr/>
+        <p:txBody>
+          <a:bodyPr>
+            <a:normAutofit/>
+          </a:bodyPr>
+          <a:lstStyle/>
+          <a:p>
+            <a:pPr>
+              <a:buFontTx/>
+              <a:buNone/>
+            </a:pPr>
+            <a:r>
+              <a:rPr lang="en-US" sz="1200" kern="1200" dirty="0" smtClean="0">
+                <a:solidFill>
+                  <a:schemeClr val="tx1"/>
+                </a:solidFill>
+                <a:latin typeface="+mn-lt"/>
+                <a:ea typeface="+mn-ea"/>
+                <a:cs typeface="+mn-cs"/>
+              </a:rPr>
               <a:t>- load stories from mongo and show in correct </a:t>
             </a:r>
             <a:r>
@@ -679,7 +833,7 @@
             <a:fld id="{E91D8FCE-2AFE-2844-95F7-FD897434AF0C}" type="slidenum">
               <a:rPr lang="en-US" smtClean="0"/>
               <a:pPr/>
-              <a:t>24</a:t>
+              <a:t>25</a:t>
             </a:fld>
             <a:endParaRPr lang="en-US"/>
           </a:p>
@@ -693,7 +847,7 @@
 </p:notes>
 </file>
 
-<file path=ppt/notesSlides/notesSlide11.xml><?xml version="1.0" encoding="utf-8"?>
+<file path=ppt/notesSlides/notesSlide12.xml><?xml version="1.0" encoding="utf-8"?>
 <p:notes xmlns:a="http://schemas.openxmlformats.org/drawingml/2006/main" xmlns:r="http://schemas.openxmlformats.org/officeDocument/2006/relationships" xmlns:mc="http://schemas.openxmlformats.org/markup-compatibility/2006" xmlns:mv="urn:schemas-microsoft-com:mac:vml" xmlns:p="http://schemas.openxmlformats.org/presentationml/2006/main" mc:Ignorable="mv" mc:PreserveAttributes="mv:*">
   <p:cSld>
     <p:spTree>
@@ -781,7 +935,7 @@
                 </a:solidFill>
               </a:rPr>
               <a:pPr/>
-              <a:t>25</a:t>
+              <a:t>26</a:t>
             </a:fld>
             <a:endParaRPr lang="en-US">
               <a:solidFill>
@@ -799,7 +953,7 @@
 </p:notes>
 </file>
 
-<file path=ppt/notesSlides/notesSlide12.xml><?xml version="1.0" encoding="utf-8"?>
+<file path=ppt/notesSlides/notesSlide13.xml><?xml version="1.0" encoding="utf-8"?>
 <p:notes xmlns:a="http://schemas.openxmlformats.org/drawingml/2006/main" xmlns:r="http://schemas.openxmlformats.org/officeDocument/2006/relationships" xmlns:mc="http://schemas.openxmlformats.org/markup-compatibility/2006" xmlns:mv="urn:schemas-microsoft-com:mac:vml" xmlns:p="http://schemas.openxmlformats.org/presentationml/2006/main" mc:Ignorable="mv" mc:PreserveAttributes="mv:*">
   <p:cSld>
     <p:spTree>
@@ -927,7 +1081,7 @@
             <a:fld id="{E91D8FCE-2AFE-2844-95F7-FD897434AF0C}" type="slidenum">
               <a:rPr lang="en-US" smtClean="0"/>
               <a:pPr/>
-              <a:t>26</a:t>
+              <a:t>27</a:t>
             </a:fld>
             <a:endParaRPr lang="en-US"/>
           </a:p>
@@ -941,7 +1095,7 @@
 </p:notes>
 </file>
 
-<file path=ppt/notesSlides/notesSlide13.xml><?xml version="1.0" encoding="utf-8"?>
+<file path=ppt/notesSlides/notesSlide14.xml><?xml version="1.0" encoding="utf-8"?>
 <p:notes xmlns:a="http://schemas.openxmlformats.org/drawingml/2006/main" xmlns:r="http://schemas.openxmlformats.org/officeDocument/2006/relationships" xmlns:mc="http://schemas.openxmlformats.org/markup-compatibility/2006" xmlns:mv="urn:schemas-microsoft-com:mac:vml" xmlns:p="http://schemas.openxmlformats.org/presentationml/2006/main" mc:Ignorable="mv" mc:PreserveAttributes="mv:*">
   <p:cSld>
     <p:spTree>
@@ -1072,7 +1226,7 @@
             <a:fld id="{E91D8FCE-2AFE-2844-95F7-FD897434AF0C}" type="slidenum">
               <a:rPr lang="en-US" smtClean="0"/>
               <a:pPr/>
-              <a:t>27</a:t>
+              <a:t>28</a:t>
             </a:fld>
             <a:endParaRPr lang="en-US"/>
           </a:p>
@@ -1086,7 +1240,7 @@
 </p:notes>
 </file>
 
-<file path=ppt/notesSlides/notesSlide14.xml><?xml version="1.0" encoding="utf-8"?>
+<file path=ppt/notesSlides/notesSlide15.xml><?xml version="1.0" encoding="utf-8"?>
 <p:notes xmlns:a="http://schemas.openxmlformats.org/drawingml/2006/main" xmlns:r="http://schemas.openxmlformats.org/officeDocument/2006/relationships" xmlns:mc="http://schemas.openxmlformats.org/markup-compatibility/2006" xmlns:mv="urn:schemas-microsoft-com:mac:vml" xmlns:p="http://schemas.openxmlformats.org/presentationml/2006/main" mc:Ignorable="mv" mc:PreserveAttributes="mv:*">
   <p:cSld>
     <p:spTree>
@@ -1154,7 +1308,7 @@
             <a:fld id="{E91D8FCE-2AFE-2844-95F7-FD897434AF0C}" type="slidenum">
               <a:rPr lang="en-US" smtClean="0"/>
               <a:pPr/>
-              <a:t>33</a:t>
+              <a:t>34</a:t>
             </a:fld>
             <a:endParaRPr lang="en-US"/>
           </a:p>
@@ -1304,6 +1458,14 @@
           </a:bodyPr>
           <a:lstStyle/>
           <a:p>
+            <a:r>
+              <a:rPr lang="en-US" dirty="0" smtClean="0"/>
+              <a:t>This is</a:t>
+            </a:r>
+            <a:r>
+              <a:rPr lang="en-US" baseline="0" dirty="0" smtClean="0"/>
+              <a:t> the stack we’ll be using for this tutorial</a:t>
+            </a:r>
             <a:endParaRPr lang="en-US" dirty="0"/>
           </a:p>
         </p:txBody>
@@ -1386,10 +1548,6 @@
           </a:bodyPr>
           <a:lstStyle/>
           <a:p>
-            <a:r>
-              <a:rPr lang="en-US" dirty="0" smtClean="0"/>
-              <a:t>Link to blog post to see the instructions for everything you need to set up.</a:t>
-            </a:r>
             <a:endParaRPr lang="en-US" dirty="0"/>
           </a:p>
         </p:txBody>
@@ -1427,6 +1585,92 @@
 </file>
 
 <file path=ppt/notesSlides/notesSlide5.xml><?xml version="1.0" encoding="utf-8"?>
+<p:notes xmlns:a="http://schemas.openxmlformats.org/drawingml/2006/main" xmlns:r="http://schemas.openxmlformats.org/officeDocument/2006/relationships" xmlns:mc="http://schemas.openxmlformats.org/markup-compatibility/2006" xmlns:mv="urn:schemas-microsoft-com:mac:vml" xmlns:p="http://schemas.openxmlformats.org/presentationml/2006/main" mc:Ignorable="mv" mc:PreserveAttributes="mv:*">
+  <p:cSld>
+    <p:spTree>
+      <p:nvGrpSpPr>
+        <p:cNvPr id="1" name=""/>
+        <p:cNvGrpSpPr/>
+        <p:nvPr/>
+      </p:nvGrpSpPr>
+      <p:grpSpPr>
+        <a:xfrm>
+          <a:off x="0" y="0"/>
+          <a:ext cx="0" cy="0"/>
+          <a:chOff x="0" y="0"/>
+          <a:chExt cx="0" cy="0"/>
+        </a:xfrm>
+      </p:grpSpPr>
+      <p:sp>
+        <p:nvSpPr>
+          <p:cNvPr id="2" name="Slide Image Placeholder 1"/>
+          <p:cNvSpPr>
+            <a:spLocks noGrp="1" noRot="1" noChangeAspect="1"/>
+          </p:cNvSpPr>
+          <p:nvPr>
+            <p:ph type="sldImg"/>
+          </p:nvPr>
+        </p:nvSpPr>
+        <p:spPr/>
+      </p:sp>
+      <p:sp>
+        <p:nvSpPr>
+          <p:cNvPr id="3" name="Notes Placeholder 2"/>
+          <p:cNvSpPr>
+            <a:spLocks noGrp="1"/>
+          </p:cNvSpPr>
+          <p:nvPr>
+            <p:ph type="body" idx="1"/>
+          </p:nvPr>
+        </p:nvSpPr>
+        <p:spPr/>
+        <p:txBody>
+          <a:bodyPr>
+            <a:normAutofit/>
+          </a:bodyPr>
+          <a:lstStyle/>
+          <a:p>
+            <a:r>
+              <a:rPr lang="en-US" dirty="0" smtClean="0"/>
+              <a:t>Link to blog post to see the instructions for everything you need to set up.</a:t>
+            </a:r>
+            <a:endParaRPr lang="en-US" dirty="0"/>
+          </a:p>
+        </p:txBody>
+      </p:sp>
+      <p:sp>
+        <p:nvSpPr>
+          <p:cNvPr id="4" name="Slide Number Placeholder 3"/>
+          <p:cNvSpPr>
+            <a:spLocks noGrp="1"/>
+          </p:cNvSpPr>
+          <p:nvPr>
+            <p:ph type="sldNum" sz="quarter" idx="10"/>
+          </p:nvPr>
+        </p:nvSpPr>
+        <p:spPr/>
+        <p:txBody>
+          <a:bodyPr/>
+          <a:lstStyle/>
+          <a:p>
+            <a:fld id="{E91D8FCE-2AFE-2844-95F7-FD897434AF0C}" type="slidenum">
+              <a:rPr lang="en-US" smtClean="0"/>
+              <a:pPr/>
+              <a:t>8</a:t>
+            </a:fld>
+            <a:endParaRPr lang="en-US"/>
+          </a:p>
+        </p:txBody>
+      </p:sp>
+    </p:spTree>
+  </p:cSld>
+  <p:clrMapOvr>
+    <a:masterClrMapping/>
+  </p:clrMapOvr>
+</p:notes>
+</file>
+
+<file path=ppt/notesSlides/notesSlide6.xml><?xml version="1.0" encoding="utf-8"?>
 <p:notes xmlns:a="http://schemas.openxmlformats.org/drawingml/2006/main" xmlns:r="http://schemas.openxmlformats.org/officeDocument/2006/relationships" xmlns:mc="http://schemas.openxmlformats.org/markup-compatibility/2006" xmlns:mv="urn:schemas-microsoft-com:mac:vml" xmlns:p="http://schemas.openxmlformats.org/presentationml/2006/main" mc:Ignorable="mv" mc:PreserveAttributes="mv:*">
   <p:cSld>
     <p:spTree>
@@ -1597,7 +1841,7 @@
             <a:fld id="{E91D8FCE-2AFE-2844-95F7-FD897434AF0C}" type="slidenum">
               <a:rPr lang="en-US" smtClean="0"/>
               <a:pPr/>
-              <a:t>13</a:t>
+              <a:t>14</a:t>
             </a:fld>
             <a:endParaRPr lang="en-US"/>
           </a:p>
@@ -1611,7 +1855,7 @@
 </p:notes>
 </file>
 
-<file path=ppt/notesSlides/notesSlide6.xml><?xml version="1.0" encoding="utf-8"?>
+<file path=ppt/notesSlides/notesSlide7.xml><?xml version="1.0" encoding="utf-8"?>
 <p:notes xmlns:a="http://schemas.openxmlformats.org/drawingml/2006/main" xmlns:r="http://schemas.openxmlformats.org/officeDocument/2006/relationships" xmlns:mc="http://schemas.openxmlformats.org/markup-compatibility/2006" xmlns:mv="urn:schemas-microsoft-com:mac:vml" xmlns:p="http://schemas.openxmlformats.org/presentationml/2006/main" mc:Ignorable="mv" mc:PreserveAttributes="mv:*">
   <p:cSld>
     <p:spTree>
@@ -1699,7 +1943,7 @@
                 </a:solidFill>
               </a:rPr>
               <a:pPr/>
-              <a:t>14</a:t>
+              <a:t>15</a:t>
             </a:fld>
             <a:endParaRPr lang="en-US">
               <a:solidFill>
@@ -1717,7 +1961,7 @@
 </p:notes>
 </file>
 
-<file path=ppt/notesSlides/notesSlide7.xml><?xml version="1.0" encoding="utf-8"?>
+<file path=ppt/notesSlides/notesSlide8.xml><?xml version="1.0" encoding="utf-8"?>
 <p:notes xmlns:a="http://schemas.openxmlformats.org/drawingml/2006/main" xmlns:r="http://schemas.openxmlformats.org/officeDocument/2006/relationships" xmlns:mc="http://schemas.openxmlformats.org/markup-compatibility/2006" xmlns:mv="urn:schemas-microsoft-com:mac:vml" xmlns:p="http://schemas.openxmlformats.org/presentationml/2006/main" mc:Ignorable="mv" mc:PreserveAttributes="mv:*">
   <p:cSld>
     <p:spTree>
@@ -1785,7 +2029,7 @@
             <a:fld id="{E91D8FCE-2AFE-2844-95F7-FD897434AF0C}" type="slidenum">
               <a:rPr lang="en-US" smtClean="0"/>
               <a:pPr/>
-              <a:t>18</a:t>
+              <a:t>19</a:t>
             </a:fld>
             <a:endParaRPr lang="en-US"/>
           </a:p>
@@ -1799,7 +2043,7 @@
 </p:notes>
 </file>
 
-<file path=ppt/notesSlides/notesSlide8.xml><?xml version="1.0" encoding="utf-8"?>
+<file path=ppt/notesSlides/notesSlide9.xml><?xml version="1.0" encoding="utf-8"?>
 <p:notes xmlns:a="http://schemas.openxmlformats.org/drawingml/2006/main" xmlns:r="http://schemas.openxmlformats.org/officeDocument/2006/relationships" xmlns:mc="http://schemas.openxmlformats.org/markup-compatibility/2006" xmlns:mv="urn:schemas-microsoft-com:mac:vml" xmlns:p="http://schemas.openxmlformats.org/presentationml/2006/main" mc:Ignorable="mv" mc:PreserveAttributes="mv:*">
   <p:cSld>
     <p:spTree>
@@ -1984,160 +2228,7 @@
             <a:fld id="{E91D8FCE-2AFE-2844-95F7-FD897434AF0C}" type="slidenum">
               <a:rPr lang="en-US" smtClean="0"/>
               <a:pPr/>
-              <a:t>19</a:t>
-            </a:fld>
-            <a:endParaRPr lang="en-US"/>
-          </a:p>
-        </p:txBody>
-      </p:sp>
-    </p:spTree>
-  </p:cSld>
-  <p:clrMapOvr>
-    <a:masterClrMapping/>
-  </p:clrMapOvr>
-</p:notes>
-</file>
-
-<file path=ppt/notesSlides/notesSlide9.xml><?xml version="1.0" encoding="utf-8"?>
-<p:notes xmlns:a="http://schemas.openxmlformats.org/drawingml/2006/main" xmlns:r="http://schemas.openxmlformats.org/officeDocument/2006/relationships" xmlns:mc="http://schemas.openxmlformats.org/markup-compatibility/2006" xmlns:mv="urn:schemas-microsoft-com:mac:vml" xmlns:p="http://schemas.openxmlformats.org/presentationml/2006/main" mc:Ignorable="mv" mc:PreserveAttributes="mv:*">
-  <p:cSld>
-    <p:spTree>
-      <p:nvGrpSpPr>
-        <p:cNvPr id="1" name=""/>
-        <p:cNvGrpSpPr/>
-        <p:nvPr/>
-      </p:nvGrpSpPr>
-      <p:grpSpPr>
-        <a:xfrm>
-          <a:off x="0" y="0"/>
-          <a:ext cx="0" cy="0"/>
-          <a:chOff x="0" y="0"/>
-          <a:chExt cx="0" cy="0"/>
-        </a:xfrm>
-      </p:grpSpPr>
-      <p:sp>
-        <p:nvSpPr>
-          <p:cNvPr id="2" name="Slide Image Placeholder 1"/>
-          <p:cNvSpPr>
-            <a:spLocks noGrp="1" noRot="1" noChangeAspect="1"/>
-          </p:cNvSpPr>
-          <p:nvPr>
-            <p:ph type="sldImg"/>
-          </p:nvPr>
-        </p:nvSpPr>
-        <p:spPr/>
-      </p:sp>
-      <p:sp>
-        <p:nvSpPr>
-          <p:cNvPr id="3" name="Notes Placeholder 2"/>
-          <p:cNvSpPr>
-            <a:spLocks noGrp="1"/>
-          </p:cNvSpPr>
-          <p:nvPr>
-            <p:ph type="body" idx="1"/>
-          </p:nvPr>
-        </p:nvSpPr>
-        <p:spPr/>
-        <p:txBody>
-          <a:bodyPr>
-            <a:normAutofit/>
-          </a:bodyPr>
-          <a:lstStyle/>
-          <a:p>
-            <a:pPr>
-              <a:buFontTx/>
-              <a:buNone/>
-            </a:pPr>
-            <a:r>
-              <a:rPr lang="en-US" sz="1200" kern="1200" dirty="0" smtClean="0">
-                <a:solidFill>
-                  <a:schemeClr val="tx1"/>
-                </a:solidFill>
-                <a:latin typeface="+mn-lt"/>
-                <a:ea typeface="+mn-ea"/>
-                <a:cs typeface="+mn-cs"/>
-              </a:rPr>
-              <a:t>Consume the post data and create story in DB</a:t>
-            </a:r>
-          </a:p>
-          <a:p>
-            <a:pPr>
-              <a:buFontTx/>
-              <a:buNone/>
-            </a:pPr>
-            <a:endParaRPr lang="en-US" sz="1200" kern="1200" dirty="0" smtClean="0">
-              <a:solidFill>
-                <a:schemeClr val="tx1"/>
-              </a:solidFill>
-              <a:latin typeface="+mn-lt"/>
-              <a:ea typeface="+mn-ea"/>
-              <a:cs typeface="+mn-cs"/>
-            </a:endParaRPr>
-          </a:p>
-          <a:p>
-            <a:pPr>
-              <a:buFontTx/>
-              <a:buNone/>
-            </a:pPr>
-            <a:r>
-              <a:rPr lang="en-US" sz="1200" kern="1200" dirty="0" smtClean="0">
-                <a:solidFill>
-                  <a:schemeClr val="tx1"/>
-                </a:solidFill>
-                <a:latin typeface="+mn-lt"/>
-                <a:ea typeface="+mn-ea"/>
-                <a:cs typeface="+mn-cs"/>
-              </a:rPr>
-              <a:t>use Post-Redirect-Get</a:t>
-            </a:r>
-            <a:r>
-              <a:rPr lang="en-US" sz="1200" kern="1200" baseline="0" dirty="0" smtClean="0">
-                <a:solidFill>
-                  <a:schemeClr val="tx1"/>
-                </a:solidFill>
-                <a:latin typeface="+mn-lt"/>
-                <a:ea typeface="+mn-ea"/>
-                <a:cs typeface="+mn-cs"/>
-              </a:rPr>
-              <a:t> </a:t>
-            </a:r>
-            <a:r>
-              <a:rPr lang="en-US" sz="1200" kern="1200" dirty="0" smtClean="0">
-                <a:solidFill>
-                  <a:schemeClr val="tx1"/>
-                </a:solidFill>
-                <a:latin typeface="+mn-lt"/>
-                <a:ea typeface="+mn-ea"/>
-                <a:cs typeface="+mn-cs"/>
-              </a:rPr>
-              <a:t>to redirect user back to wall page after create</a:t>
-            </a:r>
-            <a:endParaRPr lang="en-US" dirty="0" smtClean="0"/>
-          </a:p>
-          <a:p>
-            <a:endParaRPr lang="en-US" dirty="0"/>
-          </a:p>
-        </p:txBody>
-      </p:sp>
-      <p:sp>
-        <p:nvSpPr>
-          <p:cNvPr id="4" name="Slide Number Placeholder 3"/>
-          <p:cNvSpPr>
-            <a:spLocks noGrp="1"/>
-          </p:cNvSpPr>
-          <p:nvPr>
-            <p:ph type="sldNum" sz="quarter" idx="10"/>
-          </p:nvPr>
-        </p:nvSpPr>
-        <p:spPr/>
-        <p:txBody>
-          <a:bodyPr/>
-          <a:lstStyle/>
-          <a:p>
-            <a:fld id="{E91D8FCE-2AFE-2844-95F7-FD897434AF0C}" type="slidenum">
-              <a:rPr lang="en-US" smtClean="0"/>
-              <a:pPr/>
-              <a:t>22</a:t>
+              <a:t>20</a:t>
             </a:fld>
             <a:endParaRPr lang="en-US"/>
           </a:p>
@@ -8126,9 +8217,7 @@
             <a:r>
               <a:rPr lang="en-US" sz="16400" b="1" spc="-2000" dirty="0" smtClean="0">
                 <a:solidFill>
-                  <a:schemeClr val="bg1">
-                    <a:lumMod val="65000"/>
-                  </a:schemeClr>
+                  <a:schemeClr val="bg1"/>
                 </a:solidFill>
                 <a:latin typeface="Arial Black"/>
                 <a:cs typeface="Arial Black"/>
@@ -8163,7 +8252,9 @@
             <a:r>
               <a:rPr lang="en-US" sz="16400" b="1" spc="-2000" dirty="0" err="1" smtClean="0">
                 <a:solidFill>
-                  <a:srgbClr val="FFFFFF"/>
+                  <a:schemeClr val="bg1">
+                    <a:lumMod val="65000"/>
+                  </a:schemeClr>
                 </a:solidFill>
                 <a:latin typeface="Arial Black"/>
                 <a:cs typeface="Arial Black"/>
@@ -8172,7 +8263,9 @@
             </a:r>
             <a:endParaRPr lang="en-US" sz="16400" b="1" spc="-2000" dirty="0" smtClean="0">
               <a:solidFill>
-                <a:srgbClr val="FFFFFF"/>
+                <a:schemeClr val="bg1">
+                  <a:lumMod val="65000"/>
+                </a:schemeClr>
               </a:solidFill>
               <a:latin typeface="Arial Black"/>
               <a:cs typeface="Arial Black"/>
@@ -8228,71 +8321,42 @@
       </p:sp>
       <p:sp>
         <p:nvSpPr>
-          <p:cNvPr id="5" name="Rectangle 4"/>
+          <p:cNvPr id="6" name="Rectangle 5"/>
           <p:cNvSpPr/>
           <p:nvPr/>
         </p:nvSpPr>
         <p:spPr>
           <a:xfrm>
-            <a:off x="22397" y="-11140"/>
-            <a:ext cx="6122189" cy="1815882"/>
+            <a:off x="-544323" y="378760"/>
+            <a:ext cx="9253823" cy="523220"/>
           </a:xfrm>
           <a:prstGeom prst="rect">
             <a:avLst/>
           </a:prstGeom>
         </p:spPr>
         <p:txBody>
-          <a:bodyPr wrap="none">
+          <a:bodyPr wrap="square">
             <a:spAutoFit/>
           </a:bodyPr>
           <a:lstStyle/>
           <a:p>
+            <a:pPr marL="514350" indent="-514350"/>
             <a:r>
               <a:rPr lang="en-US" sz="2800" b="1" dirty="0" smtClean="0">
                 <a:solidFill>
                   <a:srgbClr val="FFFFFF"/>
                 </a:solidFill>
               </a:rPr>
-              <a:t>https://github.com/signup/free</a:t>
+              <a:t>	http://</a:t>
             </a:r>
-          </a:p>
-          <a:p>
             <a:r>
               <a:rPr lang="en-US" sz="2800" b="1" dirty="0" err="1" smtClean="0">
                 <a:solidFill>
                   <a:srgbClr val="FFFFFF"/>
                 </a:solidFill>
               </a:rPr>
-              <a:t>http://help.github.com/mac-set-up-git</a:t>
+              <a:t>maven.apache.org/download.html#Installation</a:t>
             </a:r>
-            <a:r>
-              <a:rPr lang="en-US" sz="2800" b="1" dirty="0" smtClean="0">
-                <a:solidFill>
-                  <a:srgbClr val="FFFFFF"/>
-                </a:solidFill>
-              </a:rPr>
-              <a:t>/</a:t>
-            </a:r>
-          </a:p>
-          <a:p>
-            <a:r>
-              <a:rPr lang="en-US" sz="2800" b="1" dirty="0" err="1" smtClean="0">
-                <a:solidFill>
-                  <a:srgbClr val="FFFFFF"/>
-                </a:solidFill>
-              </a:rPr>
-              <a:t>http://help.github.com/win-set-up-git</a:t>
-            </a:r>
-            <a:r>
-              <a:rPr lang="en-US" sz="2800" b="1" dirty="0" smtClean="0">
-                <a:solidFill>
-                  <a:srgbClr val="FFFFFF"/>
-                </a:solidFill>
-              </a:rPr>
-              <a:t>/</a:t>
-            </a:r>
-          </a:p>
-          <a:p>
             <a:endParaRPr lang="en-US" sz="2800" b="1" dirty="0" smtClean="0">
               <a:solidFill>
                 <a:srgbClr val="FFFFFF"/>
@@ -8466,8 +8530,8 @@
         </p:nvSpPr>
         <p:spPr>
           <a:xfrm>
-            <a:off x="22397" y="200520"/>
-            <a:ext cx="8539768" cy="954107"/>
+            <a:off x="22397" y="-11140"/>
+            <a:ext cx="6122189" cy="1815882"/>
           </a:xfrm>
           <a:prstGeom prst="rect">
             <a:avLst/>
@@ -8480,74 +8544,54 @@
           <a:lstStyle/>
           <a:p>
             <a:r>
-              <a:rPr lang="en-US" sz="2800" dirty="0" smtClean="0">
+              <a:rPr lang="en-US" sz="2800" b="1" dirty="0" smtClean="0">
                 <a:solidFill>
                   <a:srgbClr val="FFFFFF"/>
                 </a:solidFill>
               </a:rPr>
-              <a:t>Send your </a:t>
+              <a:t>https://github.com/signup/free</a:t>
             </a:r>
+          </a:p>
+          <a:p>
             <a:r>
-              <a:rPr lang="en-US" sz="2800" dirty="0" err="1" smtClean="0">
+              <a:rPr lang="en-US" sz="2800" b="1" dirty="0" err="1" smtClean="0">
                 <a:solidFill>
                   <a:srgbClr val="FFFFFF"/>
                 </a:solidFill>
               </a:rPr>
-              <a:t>github</a:t>
+              <a:t>http://help.github.com/mac-set-up-git</a:t>
             </a:r>
             <a:r>
-              <a:rPr lang="en-US" sz="2800" dirty="0" smtClean="0">
+              <a:rPr lang="en-US" sz="2800" b="1" dirty="0" smtClean="0">
                 <a:solidFill>
                   <a:srgbClr val="FFFFFF"/>
                 </a:solidFill>
               </a:rPr>
-              <a:t> username to be added as a collaborator</a:t>
+              <a:t>/</a:t>
             </a:r>
           </a:p>
           <a:p>
             <a:r>
-              <a:rPr lang="en-US" sz="2800" dirty="0" smtClean="0">
+              <a:rPr lang="en-US" sz="2800" b="1" dirty="0" err="1" smtClean="0">
                 <a:solidFill>
-                  <a:srgbClr val="A6A6A6"/>
+                  <a:srgbClr val="FFFFFF"/>
                 </a:solidFill>
               </a:rPr>
-              <a:t>&gt;</a:t>
+              <a:t>http://help.github.com/win-set-up-git</a:t>
             </a:r>
             <a:r>
-              <a:rPr lang="en-US" sz="2800" dirty="0" smtClean="0">
+              <a:rPr lang="en-US" sz="2800" b="1" dirty="0" smtClean="0">
                 <a:solidFill>
-                  <a:schemeClr val="bg1"/>
+                  <a:srgbClr val="FFFFFF"/>
                 </a:solidFill>
               </a:rPr>
-              <a:t> </a:t>
+              <a:t>/</a:t>
             </a:r>
-            <a:r>
-              <a:rPr lang="en-US" sz="2800" dirty="0" err="1" smtClean="0">
-                <a:solidFill>
-                  <a:schemeClr val="bg1"/>
-                </a:solidFill>
-              </a:rPr>
-              <a:t>git</a:t>
-            </a:r>
-            <a:r>
-              <a:rPr lang="en-US" sz="2800" dirty="0" smtClean="0">
-                <a:solidFill>
-                  <a:schemeClr val="bg1"/>
-                </a:solidFill>
-              </a:rPr>
-              <a:t> clone </a:t>
-            </a:r>
-            <a:r>
-              <a:rPr lang="en-US" sz="2800" b="1" dirty="0" err="1" smtClean="0">
-                <a:solidFill>
-                  <a:schemeClr val="bg1"/>
-                </a:solidFill>
-              </a:rPr>
-              <a:t>git@github.com:akash/story-wall.git</a:t>
-            </a:r>
+          </a:p>
+          <a:p>
             <a:endParaRPr lang="en-US" sz="2800" b="1" dirty="0" smtClean="0">
               <a:solidFill>
-                <a:schemeClr val="bg1"/>
+                <a:srgbClr val="FFFFFF"/>
               </a:solidFill>
             </a:endParaRPr>
           </a:p>
@@ -8647,6 +8691,258 @@
             <a:r>
               <a:rPr lang="en-US" sz="16400" b="1" spc="-2000" dirty="0" err="1" smtClean="0">
                 <a:solidFill>
+                  <a:srgbClr val="FFFFFF"/>
+                </a:solidFill>
+                <a:latin typeface="Arial Black"/>
+                <a:cs typeface="Arial Black"/>
+              </a:rPr>
+              <a:t>Git</a:t>
+            </a:r>
+            <a:endParaRPr lang="en-US" sz="16400" b="1" spc="-2000" dirty="0" smtClean="0">
+              <a:solidFill>
+                <a:srgbClr val="FFFFFF"/>
+              </a:solidFill>
+              <a:latin typeface="Arial Black"/>
+              <a:cs typeface="Arial Black"/>
+            </a:endParaRPr>
+          </a:p>
+        </p:txBody>
+      </p:sp>
+      <p:sp>
+        <p:nvSpPr>
+          <p:cNvPr id="4" name="TextBox 3"/>
+          <p:cNvSpPr txBox="1"/>
+          <p:nvPr/>
+        </p:nvSpPr>
+        <p:spPr>
+          <a:xfrm>
+            <a:off x="-155587" y="4190279"/>
+            <a:ext cx="9571851" cy="2646878"/>
+          </a:xfrm>
+          <a:prstGeom prst="rect">
+            <a:avLst/>
+          </a:prstGeom>
+          <a:noFill/>
+        </p:spPr>
+        <p:txBody>
+          <a:bodyPr wrap="none" rtlCol="0">
+            <a:spAutoFit/>
+          </a:bodyPr>
+          <a:lstStyle/>
+          <a:p>
+            <a:r>
+              <a:rPr lang="en-US" sz="16400" b="1" spc="-2000" dirty="0" err="1" smtClean="0">
+                <a:solidFill>
+                  <a:schemeClr val="bg1">
+                    <a:lumMod val="65000"/>
+                  </a:schemeClr>
+                </a:solidFill>
+                <a:latin typeface="Arial Black"/>
+                <a:cs typeface="Arial Black"/>
+              </a:rPr>
+              <a:t>MongoDB</a:t>
+            </a:r>
+            <a:endParaRPr lang="en-US" sz="16400" b="1" spc="-2000" dirty="0">
+              <a:solidFill>
+                <a:schemeClr val="bg1">
+                  <a:lumMod val="65000"/>
+                </a:schemeClr>
+              </a:solidFill>
+              <a:latin typeface="Arial Black"/>
+              <a:cs typeface="Arial Black"/>
+            </a:endParaRPr>
+          </a:p>
+        </p:txBody>
+      </p:sp>
+      <p:sp>
+        <p:nvSpPr>
+          <p:cNvPr id="5" name="Rectangle 4"/>
+          <p:cNvSpPr/>
+          <p:nvPr/>
+        </p:nvSpPr>
+        <p:spPr>
+          <a:xfrm>
+            <a:off x="22397" y="200520"/>
+            <a:ext cx="8539768" cy="954107"/>
+          </a:xfrm>
+          <a:prstGeom prst="rect">
+            <a:avLst/>
+          </a:prstGeom>
+        </p:spPr>
+        <p:txBody>
+          <a:bodyPr wrap="none">
+            <a:spAutoFit/>
+          </a:bodyPr>
+          <a:lstStyle/>
+          <a:p>
+            <a:r>
+              <a:rPr lang="en-US" sz="2800" dirty="0" smtClean="0">
+                <a:solidFill>
+                  <a:srgbClr val="FFFFFF"/>
+                </a:solidFill>
+              </a:rPr>
+              <a:t>Send your </a:t>
+            </a:r>
+            <a:r>
+              <a:rPr lang="en-US" sz="2800" dirty="0" err="1" smtClean="0">
+                <a:solidFill>
+                  <a:srgbClr val="FFFFFF"/>
+                </a:solidFill>
+              </a:rPr>
+              <a:t>github</a:t>
+            </a:r>
+            <a:r>
+              <a:rPr lang="en-US" sz="2800" dirty="0" smtClean="0">
+                <a:solidFill>
+                  <a:srgbClr val="FFFFFF"/>
+                </a:solidFill>
+              </a:rPr>
+              <a:t> username to be added as a collaborator</a:t>
+            </a:r>
+          </a:p>
+          <a:p>
+            <a:r>
+              <a:rPr lang="en-US" sz="2800" dirty="0" smtClean="0">
+                <a:solidFill>
+                  <a:srgbClr val="A6A6A6"/>
+                </a:solidFill>
+              </a:rPr>
+              <a:t>&gt;</a:t>
+            </a:r>
+            <a:r>
+              <a:rPr lang="en-US" sz="2800" dirty="0" smtClean="0">
+                <a:solidFill>
+                  <a:schemeClr val="bg1"/>
+                </a:solidFill>
+              </a:rPr>
+              <a:t> </a:t>
+            </a:r>
+            <a:r>
+              <a:rPr lang="en-US" sz="2800" dirty="0" err="1" smtClean="0">
+                <a:solidFill>
+                  <a:schemeClr val="bg1"/>
+                </a:solidFill>
+              </a:rPr>
+              <a:t>git</a:t>
+            </a:r>
+            <a:r>
+              <a:rPr lang="en-US" sz="2800" dirty="0" smtClean="0">
+                <a:solidFill>
+                  <a:schemeClr val="bg1"/>
+                </a:solidFill>
+              </a:rPr>
+              <a:t> clone </a:t>
+            </a:r>
+            <a:r>
+              <a:rPr lang="en-US" sz="2800" b="1" dirty="0" err="1" smtClean="0">
+                <a:solidFill>
+                  <a:schemeClr val="bg1"/>
+                </a:solidFill>
+              </a:rPr>
+              <a:t>git@github.com:akash/story-wall.git</a:t>
+            </a:r>
+            <a:endParaRPr lang="en-US" sz="2800" b="1" dirty="0" smtClean="0">
+              <a:solidFill>
+                <a:schemeClr val="bg1"/>
+              </a:solidFill>
+            </a:endParaRPr>
+          </a:p>
+        </p:txBody>
+      </p:sp>
+    </p:spTree>
+  </p:cSld>
+  <p:clrMapOvr>
+    <a:masterClrMapping/>
+  </p:clrMapOvr>
+  <p:timing>
+    <p:tnLst>
+      <p:par>
+        <p:cTn id="1" dur="indefinite" restart="never" nodeType="tmRoot"/>
+      </p:par>
+    </p:tnLst>
+  </p:timing>
+</p:sld>
+</file>
+
+<file path=ppt/slides/slide13.xml><?xml version="1.0" encoding="utf-8"?>
+<p:sld xmlns:a="http://schemas.openxmlformats.org/drawingml/2006/main" xmlns:r="http://schemas.openxmlformats.org/officeDocument/2006/relationships" xmlns:mc="http://schemas.openxmlformats.org/markup-compatibility/2006" xmlns:mv="urn:schemas-microsoft-com:mac:vml" xmlns:p="http://schemas.openxmlformats.org/presentationml/2006/main" mc:Ignorable="mv" mc:PreserveAttributes="mv:*">
+  <p:cSld>
+    <p:spTree>
+      <p:nvGrpSpPr>
+        <p:cNvPr id="1" name=""/>
+        <p:cNvGrpSpPr/>
+        <p:nvPr/>
+      </p:nvGrpSpPr>
+      <p:grpSpPr>
+        <a:xfrm>
+          <a:off x="0" y="0"/>
+          <a:ext cx="0" cy="0"/>
+          <a:chOff x="0" y="0"/>
+          <a:chExt cx="0" cy="0"/>
+        </a:xfrm>
+      </p:grpSpPr>
+      <p:sp>
+        <p:nvSpPr>
+          <p:cNvPr id="2" name="TextBox 1"/>
+          <p:cNvSpPr txBox="1"/>
+          <p:nvPr/>
+        </p:nvSpPr>
+        <p:spPr>
+          <a:xfrm>
+            <a:off x="-148733" y="899286"/>
+            <a:ext cx="6519734" cy="2646878"/>
+          </a:xfrm>
+          <a:prstGeom prst="rect">
+            <a:avLst/>
+          </a:prstGeom>
+          <a:noFill/>
+        </p:spPr>
+        <p:txBody>
+          <a:bodyPr wrap="none" rtlCol="0">
+            <a:spAutoFit/>
+          </a:bodyPr>
+          <a:lstStyle/>
+          <a:p>
+            <a:r>
+              <a:rPr lang="en-US" sz="16400" b="1" spc="-2000" dirty="0" smtClean="0">
+                <a:solidFill>
+                  <a:schemeClr val="bg1">
+                    <a:lumMod val="65000"/>
+                  </a:schemeClr>
+                </a:solidFill>
+                <a:latin typeface="Arial Black"/>
+                <a:cs typeface="Arial Black"/>
+              </a:rPr>
+              <a:t>Maven</a:t>
+            </a:r>
+          </a:p>
+        </p:txBody>
+      </p:sp>
+      <p:sp>
+        <p:nvSpPr>
+          <p:cNvPr id="3" name="TextBox 2"/>
+          <p:cNvSpPr txBox="1"/>
+          <p:nvPr/>
+        </p:nvSpPr>
+        <p:spPr>
+          <a:xfrm>
+            <a:off x="-109823" y="2560478"/>
+            <a:ext cx="3018775" cy="2616101"/>
+          </a:xfrm>
+          <a:prstGeom prst="rect">
+            <a:avLst/>
+          </a:prstGeom>
+          <a:noFill/>
+        </p:spPr>
+        <p:txBody>
+          <a:bodyPr wrap="none" rtlCol="0">
+            <a:spAutoFit/>
+          </a:bodyPr>
+          <a:lstStyle/>
+          <a:p>
+            <a:r>
+              <a:rPr lang="en-US" sz="16400" b="1" spc="-2000" dirty="0" err="1" smtClean="0">
+                <a:solidFill>
                   <a:schemeClr val="bg1">
                     <a:lumMod val="65000"/>
                   </a:schemeClr>
@@ -8780,7 +9076,7 @@
 </p:sld>
 </file>
 
-<file path=ppt/slides/slide13.xml><?xml version="1.0" encoding="utf-8"?>
+<file path=ppt/slides/slide14.xml><?xml version="1.0" encoding="utf-8"?>
 <p:sld xmlns:a="http://schemas.openxmlformats.org/drawingml/2006/main" xmlns:r="http://schemas.openxmlformats.org/officeDocument/2006/relationships" xmlns:mc="http://schemas.openxmlformats.org/markup-compatibility/2006" xmlns:mv="urn:schemas-microsoft-com:mac:vml" xmlns:p="http://schemas.openxmlformats.org/presentationml/2006/main" mc:Ignorable="mv" mc:PreserveAttributes="mv:*">
   <p:cSld>
     <p:spTree>
@@ -12796,7 +13092,7 @@
 </p:sld>
 </file>
 
-<file path=ppt/slides/slide14.xml><?xml version="1.0" encoding="utf-8"?>
+<file path=ppt/slides/slide15.xml><?xml version="1.0" encoding="utf-8"?>
 <p:sld xmlns:a="http://schemas.openxmlformats.org/drawingml/2006/main" xmlns:r="http://schemas.openxmlformats.org/officeDocument/2006/relationships" xmlns:mc="http://schemas.openxmlformats.org/markup-compatibility/2006" xmlns:mv="urn:schemas-microsoft-com:mac:vml" xmlns:p="http://schemas.openxmlformats.org/presentationml/2006/main" mc:Ignorable="mv" mc:PreserveAttributes="mv:*">
   <p:cSld>
     <p:bg>
@@ -12983,7 +13279,7 @@
 </p:sld>
 </file>
 
-<file path=ppt/slides/slide15.xml><?xml version="1.0" encoding="utf-8"?>
+<file path=ppt/slides/slide16.xml><?xml version="1.0" encoding="utf-8"?>
 <p:sld xmlns:a="http://schemas.openxmlformats.org/drawingml/2006/main" xmlns:r="http://schemas.openxmlformats.org/officeDocument/2006/relationships" xmlns:mc="http://schemas.openxmlformats.org/markup-compatibility/2006" xmlns:mv="urn:schemas-microsoft-com:mac:vml" xmlns:p="http://schemas.openxmlformats.org/presentationml/2006/main" mc:Ignorable="mv" mc:PreserveAttributes="mv:*">
   <p:cSld>
     <p:bg>
@@ -13085,7 +13381,7 @@
 </p:sld>
 </file>
 
-<file path=ppt/slides/slide16.xml><?xml version="1.0" encoding="utf-8"?>
+<file path=ppt/slides/slide17.xml><?xml version="1.0" encoding="utf-8"?>
 <p:sld xmlns:a="http://schemas.openxmlformats.org/drawingml/2006/main" xmlns:r="http://schemas.openxmlformats.org/officeDocument/2006/relationships" xmlns:mc="http://schemas.openxmlformats.org/markup-compatibility/2006" xmlns:mv="urn:schemas-microsoft-com:mac:vml" xmlns:p="http://schemas.openxmlformats.org/presentationml/2006/main" mc:Ignorable="mv" mc:PreserveAttributes="mv:*">
   <p:cSld>
     <p:bg>
@@ -13187,7 +13483,7 @@
 </p:sld>
 </file>
 
-<file path=ppt/slides/slide17.xml><?xml version="1.0" encoding="utf-8"?>
+<file path=ppt/slides/slide18.xml><?xml version="1.0" encoding="utf-8"?>
 <p:sld xmlns:a="http://schemas.openxmlformats.org/drawingml/2006/main" xmlns:r="http://schemas.openxmlformats.org/officeDocument/2006/relationships" xmlns:mc="http://schemas.openxmlformats.org/markup-compatibility/2006" xmlns:mv="urn:schemas-microsoft-com:mac:vml" xmlns:p="http://schemas.openxmlformats.org/presentationml/2006/main" mc:Ignorable="mv" mc:PreserveAttributes="mv:*">
   <p:cSld>
     <p:bg>
@@ -13281,7 +13577,7 @@
 </p:sld>
 </file>
 
-<file path=ppt/slides/slide18.xml><?xml version="1.0" encoding="utf-8"?>
+<file path=ppt/slides/slide19.xml><?xml version="1.0" encoding="utf-8"?>
 <p:sld xmlns:a="http://schemas.openxmlformats.org/drawingml/2006/main" xmlns:r="http://schemas.openxmlformats.org/officeDocument/2006/relationships" xmlns:mc="http://schemas.openxmlformats.org/markup-compatibility/2006" xmlns:mv="urn:schemas-microsoft-com:mac:vml" xmlns:p="http://schemas.openxmlformats.org/presentationml/2006/main" mc:Ignorable="mv" mc:PreserveAttributes="mv:*">
   <p:cSld>
     <p:spTree>
@@ -13313,7 +13609,679 @@
 </p:sld>
 </file>
 
-<file path=ppt/slides/slide19.xml><?xml version="1.0" encoding="utf-8"?>
+<file path=ppt/slides/slide2.xml><?xml version="1.0" encoding="utf-8"?>
+<p:sld xmlns:a="http://schemas.openxmlformats.org/drawingml/2006/main" xmlns:r="http://schemas.openxmlformats.org/officeDocument/2006/relationships" xmlns:mc="http://schemas.openxmlformats.org/markup-compatibility/2006" xmlns:mv="urn:schemas-microsoft-com:mac:vml" xmlns:p="http://schemas.openxmlformats.org/presentationml/2006/main" mc:Ignorable="mv" mc:PreserveAttributes="mv:*">
+  <p:cSld>
+    <p:spTree>
+      <p:nvGrpSpPr>
+        <p:cNvPr id="1" name=""/>
+        <p:cNvGrpSpPr/>
+        <p:nvPr/>
+      </p:nvGrpSpPr>
+      <p:grpSpPr>
+        <a:xfrm>
+          <a:off x="0" y="0"/>
+          <a:ext cx="0" cy="0"/>
+          <a:chOff x="0" y="0"/>
+          <a:chExt cx="0" cy="0"/>
+        </a:xfrm>
+      </p:grpSpPr>
+      <p:sp>
+        <p:nvSpPr>
+          <p:cNvPr id="4" name="TextBox 3"/>
+          <p:cNvSpPr txBox="1"/>
+          <p:nvPr/>
+        </p:nvSpPr>
+        <p:spPr>
+          <a:xfrm>
+            <a:off x="2766477" y="287674"/>
+            <a:ext cx="2994680" cy="707886"/>
+          </a:xfrm>
+          <a:prstGeom prst="rect">
+            <a:avLst/>
+          </a:prstGeom>
+          <a:noFill/>
+        </p:spPr>
+        <p:txBody>
+          <a:bodyPr wrap="none" rtlCol="0">
+            <a:spAutoFit/>
+          </a:bodyPr>
+          <a:lstStyle/>
+          <a:p>
+            <a:r>
+              <a:rPr lang="en-US" sz="4000" b="1" dirty="0" smtClean="0">
+                <a:solidFill>
+                  <a:schemeClr val="bg1"/>
+                </a:solidFill>
+                <a:latin typeface="+mj-lt"/>
+                <a:cs typeface="Arial Black"/>
+              </a:rPr>
+              <a:t>Who </a:t>
+            </a:r>
+            <a:r>
+              <a:rPr lang="en-US" sz="4000" b="1" dirty="0" smtClean="0">
+                <a:solidFill>
+                  <a:schemeClr val="bg1">
+                    <a:lumMod val="50000"/>
+                  </a:schemeClr>
+                </a:solidFill>
+                <a:latin typeface="+mj-lt"/>
+                <a:cs typeface="Arial Black"/>
+              </a:rPr>
+              <a:t>are we?</a:t>
+            </a:r>
+            <a:endParaRPr lang="en-US" sz="4000" b="1" dirty="0">
+              <a:solidFill>
+                <a:schemeClr val="bg1">
+                  <a:lumMod val="50000"/>
+                </a:schemeClr>
+              </a:solidFill>
+              <a:latin typeface="+mj-lt"/>
+              <a:cs typeface="Arial Black"/>
+            </a:endParaRPr>
+          </a:p>
+        </p:txBody>
+      </p:sp>
+      <p:sp>
+        <p:nvSpPr>
+          <p:cNvPr id="5" name="TextBox 4"/>
+          <p:cNvSpPr txBox="1"/>
+          <p:nvPr/>
+        </p:nvSpPr>
+        <p:spPr>
+          <a:xfrm>
+            <a:off x="6034075" y="4275173"/>
+            <a:ext cx="2905763" cy="707886"/>
+          </a:xfrm>
+          <a:prstGeom prst="rect">
+            <a:avLst/>
+          </a:prstGeom>
+          <a:noFill/>
+        </p:spPr>
+        <p:txBody>
+          <a:bodyPr wrap="none" rtlCol="0">
+            <a:spAutoFit/>
+          </a:bodyPr>
+          <a:lstStyle/>
+          <a:p>
+            <a:r>
+              <a:rPr lang="en-US" sz="4000" b="1" dirty="0" smtClean="0">
+                <a:solidFill>
+                  <a:schemeClr val="bg1"/>
+                </a:solidFill>
+              </a:rPr>
+              <a:t>Akash </a:t>
+            </a:r>
+            <a:r>
+              <a:rPr lang="en-US" sz="4000" b="1" dirty="0" err="1" smtClean="0">
+                <a:solidFill>
+                  <a:schemeClr val="bg1">
+                    <a:lumMod val="50000"/>
+                  </a:schemeClr>
+                </a:solidFill>
+              </a:rPr>
+              <a:t>Bhalla</a:t>
+            </a:r>
+            <a:endParaRPr lang="en-US" sz="4000" b="1" dirty="0">
+              <a:solidFill>
+                <a:schemeClr val="bg1">
+                  <a:lumMod val="50000"/>
+                </a:schemeClr>
+              </a:solidFill>
+            </a:endParaRPr>
+          </a:p>
+        </p:txBody>
+      </p:sp>
+      <p:grpSp>
+        <p:nvGrpSpPr>
+          <p:cNvPr id="9" name="Group 8"/>
+          <p:cNvGrpSpPr/>
+          <p:nvPr/>
+        </p:nvGrpSpPr>
+        <p:grpSpPr>
+          <a:xfrm rot="20236626">
+            <a:off x="5034530" y="883651"/>
+            <a:ext cx="2808996" cy="3078659"/>
+            <a:chOff x="644769" y="1817077"/>
+            <a:chExt cx="2442308" cy="2676769"/>
+          </a:xfrm>
+          <a:effectLst>
+            <a:outerShdw blurRad="50800" dist="38100" dir="2700000" algn="tl" rotWithShape="0">
+              <a:srgbClr val="000000">
+                <a:alpha val="43000"/>
+              </a:srgbClr>
+            </a:outerShdw>
+          </a:effectLst>
+        </p:grpSpPr>
+        <p:sp>
+          <p:nvSpPr>
+            <p:cNvPr id="7" name="Rectangle 6"/>
+            <p:cNvSpPr/>
+            <p:nvPr/>
+          </p:nvSpPr>
+          <p:spPr>
+            <a:xfrm>
+              <a:off x="644769" y="1817077"/>
+              <a:ext cx="2442308" cy="2676769"/>
+            </a:xfrm>
+            <a:prstGeom prst="rect">
+              <a:avLst/>
+            </a:prstGeom>
+            <a:solidFill>
+              <a:schemeClr val="bg1"/>
+            </a:solidFill>
+            <a:ln>
+              <a:noFill/>
+            </a:ln>
+            <a:effectLst/>
+          </p:spPr>
+          <p:style>
+            <a:lnRef idx="1">
+              <a:schemeClr val="accent1"/>
+            </a:lnRef>
+            <a:fillRef idx="3">
+              <a:schemeClr val="accent1"/>
+            </a:fillRef>
+            <a:effectRef idx="2">
+              <a:schemeClr val="accent1"/>
+            </a:effectRef>
+            <a:fontRef idx="minor">
+              <a:schemeClr val="lt1"/>
+            </a:fontRef>
+          </p:style>
+          <p:txBody>
+            <a:bodyPr rtlCol="0" anchor="ctr"/>
+            <a:lstStyle/>
+            <a:p>
+              <a:pPr algn="ctr"/>
+              <a:endParaRPr lang="en-US"/>
+            </a:p>
+          </p:txBody>
+        </p:sp>
+        <p:pic>
+          <p:nvPicPr>
+            <p:cNvPr id="8" name="Picture 7"/>
+            <p:cNvPicPr>
+              <a:picLocks noChangeAspect="1"/>
+            </p:cNvPicPr>
+            <p:nvPr/>
+          </p:nvPicPr>
+          <p:blipFill>
+            <a:blip r:embed="rId2"/>
+            <a:stretch>
+              <a:fillRect/>
+            </a:stretch>
+          </p:blipFill>
+          <p:spPr>
+            <a:xfrm>
+              <a:off x="771764" y="1934309"/>
+              <a:ext cx="2178543" cy="2178543"/>
+            </a:xfrm>
+            <a:prstGeom prst="rect">
+              <a:avLst/>
+            </a:prstGeom>
+            <a:ln w="15875">
+              <a:solidFill>
+                <a:schemeClr val="tx1"/>
+              </a:solidFill>
+            </a:ln>
+          </p:spPr>
+        </p:pic>
+      </p:grpSp>
+      <p:grpSp>
+        <p:nvGrpSpPr>
+          <p:cNvPr id="14" name="Group 13"/>
+          <p:cNvGrpSpPr/>
+          <p:nvPr/>
+        </p:nvGrpSpPr>
+        <p:grpSpPr>
+          <a:xfrm rot="1257303">
+            <a:off x="842166" y="898690"/>
+            <a:ext cx="2873532" cy="3143314"/>
+            <a:chOff x="5778663" y="1817077"/>
+            <a:chExt cx="2447029" cy="2676769"/>
+          </a:xfrm>
+          <a:effectLst>
+            <a:outerShdw blurRad="50800" dist="38100" dir="2700000" algn="tl" rotWithShape="0">
+              <a:srgbClr val="000000">
+                <a:alpha val="43000"/>
+              </a:srgbClr>
+            </a:outerShdw>
+          </a:effectLst>
+        </p:grpSpPr>
+        <p:sp>
+          <p:nvSpPr>
+            <p:cNvPr id="11" name="Rectangle 10"/>
+            <p:cNvSpPr/>
+            <p:nvPr/>
+          </p:nvSpPr>
+          <p:spPr>
+            <a:xfrm>
+              <a:off x="5778663" y="1817077"/>
+              <a:ext cx="2447029" cy="2676769"/>
+            </a:xfrm>
+            <a:prstGeom prst="rect">
+              <a:avLst/>
+            </a:prstGeom>
+            <a:solidFill>
+              <a:schemeClr val="bg1"/>
+            </a:solidFill>
+            <a:ln>
+              <a:noFill/>
+            </a:ln>
+            <a:effectLst/>
+          </p:spPr>
+          <p:style>
+            <a:lnRef idx="1">
+              <a:schemeClr val="accent1"/>
+            </a:lnRef>
+            <a:fillRef idx="3">
+              <a:schemeClr val="accent1"/>
+            </a:fillRef>
+            <a:effectRef idx="2">
+              <a:schemeClr val="accent1"/>
+            </a:effectRef>
+            <a:fontRef idx="minor">
+              <a:schemeClr val="lt1"/>
+            </a:fontRef>
+          </p:style>
+          <p:txBody>
+            <a:bodyPr rtlCol="0" anchor="ctr"/>
+            <a:lstStyle/>
+            <a:p>
+              <a:pPr algn="ctr"/>
+              <a:endParaRPr lang="en-US"/>
+            </a:p>
+          </p:txBody>
+        </p:sp>
+        <p:pic>
+          <p:nvPicPr>
+            <p:cNvPr id="13" name="Picture 12"/>
+            <p:cNvPicPr>
+              <a:picLocks noChangeAspect="1"/>
+            </p:cNvPicPr>
+            <p:nvPr/>
+          </p:nvPicPr>
+          <p:blipFill>
+            <a:blip r:embed="rId3"/>
+            <a:stretch>
+              <a:fillRect/>
+            </a:stretch>
+          </p:blipFill>
+          <p:spPr>
+            <a:xfrm>
+              <a:off x="5907477" y="1937354"/>
+              <a:ext cx="2178543" cy="2178543"/>
+            </a:xfrm>
+            <a:prstGeom prst="rect">
+              <a:avLst/>
+            </a:prstGeom>
+            <a:ln w="15875">
+              <a:solidFill>
+                <a:schemeClr val="tx1"/>
+              </a:solidFill>
+            </a:ln>
+          </p:spPr>
+        </p:pic>
+      </p:grpSp>
+      <p:sp>
+        <p:nvSpPr>
+          <p:cNvPr id="6" name="TextBox 5"/>
+          <p:cNvSpPr txBox="1"/>
+          <p:nvPr/>
+        </p:nvSpPr>
+        <p:spPr>
+          <a:xfrm>
+            <a:off x="124700" y="4275173"/>
+            <a:ext cx="3878836" cy="707886"/>
+          </a:xfrm>
+          <a:prstGeom prst="rect">
+            <a:avLst/>
+          </a:prstGeom>
+          <a:noFill/>
+        </p:spPr>
+        <p:txBody>
+          <a:bodyPr wrap="none" rtlCol="0">
+            <a:spAutoFit/>
+          </a:bodyPr>
+          <a:lstStyle/>
+          <a:p>
+            <a:r>
+              <a:rPr lang="en-US" sz="4000" b="1" dirty="0" smtClean="0">
+                <a:solidFill>
+                  <a:schemeClr val="bg1"/>
+                </a:solidFill>
+              </a:rPr>
+              <a:t>David </a:t>
+            </a:r>
+            <a:r>
+              <a:rPr lang="en-US" sz="4000" b="1" dirty="0" err="1" smtClean="0">
+                <a:solidFill>
+                  <a:schemeClr val="bg1">
+                    <a:lumMod val="50000"/>
+                  </a:schemeClr>
+                </a:solidFill>
+              </a:rPr>
+              <a:t>Morgantini</a:t>
+            </a:r>
+            <a:endParaRPr lang="en-US" sz="4000" b="1" dirty="0">
+              <a:solidFill>
+                <a:schemeClr val="bg1">
+                  <a:lumMod val="50000"/>
+                </a:schemeClr>
+              </a:solidFill>
+            </a:endParaRPr>
+          </a:p>
+        </p:txBody>
+      </p:sp>
+      <p:sp>
+        <p:nvSpPr>
+          <p:cNvPr id="18" name="TextBox 17"/>
+          <p:cNvSpPr txBox="1"/>
+          <p:nvPr/>
+        </p:nvSpPr>
+        <p:spPr>
+          <a:xfrm>
+            <a:off x="4909045" y="5194073"/>
+            <a:ext cx="4109343" cy="1323439"/>
+          </a:xfrm>
+          <a:prstGeom prst="rect">
+            <a:avLst/>
+          </a:prstGeom>
+          <a:noFill/>
+        </p:spPr>
+        <p:txBody>
+          <a:bodyPr wrap="none" rtlCol="0">
+            <a:spAutoFit/>
+          </a:bodyPr>
+          <a:lstStyle/>
+          <a:p>
+            <a:pPr algn="r"/>
+            <a:r>
+              <a:rPr lang="en-US" sz="2000" dirty="0" smtClean="0">
+                <a:solidFill>
+                  <a:srgbClr val="FFFFFF"/>
+                </a:solidFill>
+              </a:rPr>
+              <a:t>Software developer @ Thought</a:t>
+            </a:r>
+            <a:r>
+              <a:rPr lang="en-US" sz="2000" b="1" dirty="0" smtClean="0">
+                <a:solidFill>
+                  <a:schemeClr val="bg1">
+                    <a:lumMod val="65000"/>
+                  </a:schemeClr>
+                </a:solidFill>
+              </a:rPr>
+              <a:t>Works</a:t>
+            </a:r>
+          </a:p>
+          <a:p>
+            <a:pPr algn="r"/>
+            <a:r>
+              <a:rPr lang="en-US" sz="2000" dirty="0" smtClean="0">
+                <a:solidFill>
+                  <a:srgbClr val="FFFFFF"/>
+                </a:solidFill>
+              </a:rPr>
+              <a:t>akash@thoughtworks.com</a:t>
+            </a:r>
+          </a:p>
+          <a:p>
+            <a:pPr algn="r"/>
+            <a:r>
+              <a:rPr lang="en-US" sz="2000" dirty="0" smtClean="0">
+                <a:solidFill>
+                  <a:srgbClr val="FFFFFF"/>
+                </a:solidFill>
+              </a:rPr>
+              <a:t>http://</a:t>
+            </a:r>
+            <a:r>
+              <a:rPr lang="en-US" sz="2000" dirty="0" err="1" smtClean="0">
+                <a:solidFill>
+                  <a:srgbClr val="FFFFFF"/>
+                </a:solidFill>
+              </a:rPr>
+              <a:t>www.akashb.com</a:t>
+            </a:r>
+            <a:r>
+              <a:rPr lang="en-US" sz="2000" dirty="0" smtClean="0">
+                <a:solidFill>
+                  <a:srgbClr val="FFFFFF"/>
+                </a:solidFill>
+              </a:rPr>
+              <a:t>/blog</a:t>
+            </a:r>
+          </a:p>
+          <a:p>
+            <a:pPr algn="r"/>
+            <a:r>
+              <a:rPr lang="en-US" sz="2000" dirty="0" smtClean="0">
+                <a:solidFill>
+                  <a:srgbClr val="FFFFFF"/>
+                </a:solidFill>
+              </a:rPr>
+              <a:t>@</a:t>
+            </a:r>
+            <a:r>
+              <a:rPr lang="en-US" sz="2000" dirty="0" err="1" smtClean="0">
+                <a:solidFill>
+                  <a:srgbClr val="FFFFFF"/>
+                </a:solidFill>
+              </a:rPr>
+              <a:t>akashb</a:t>
+            </a:r>
+            <a:endParaRPr lang="en-US" sz="2000" dirty="0">
+              <a:solidFill>
+                <a:srgbClr val="FFFFFF"/>
+              </a:solidFill>
+            </a:endParaRPr>
+          </a:p>
+        </p:txBody>
+      </p:sp>
+      <p:sp>
+        <p:nvSpPr>
+          <p:cNvPr id="19" name="TextBox 18"/>
+          <p:cNvSpPr txBox="1"/>
+          <p:nvPr/>
+        </p:nvSpPr>
+        <p:spPr>
+          <a:xfrm>
+            <a:off x="124700" y="5194073"/>
+            <a:ext cx="4275529" cy="1015663"/>
+          </a:xfrm>
+          <a:prstGeom prst="rect">
+            <a:avLst/>
+          </a:prstGeom>
+          <a:noFill/>
+        </p:spPr>
+        <p:txBody>
+          <a:bodyPr wrap="none" rtlCol="0">
+            <a:spAutoFit/>
+          </a:bodyPr>
+          <a:lstStyle/>
+          <a:p>
+            <a:r>
+              <a:rPr lang="en-US" sz="2000" dirty="0" smtClean="0">
+                <a:solidFill>
+                  <a:srgbClr val="FFFFFF"/>
+                </a:solidFill>
+              </a:rPr>
+              <a:t>Software developer @ Thought</a:t>
+            </a:r>
+            <a:r>
+              <a:rPr lang="en-US" sz="2000" b="1" dirty="0" smtClean="0">
+                <a:solidFill>
+                  <a:schemeClr val="bg1">
+                    <a:lumMod val="65000"/>
+                  </a:schemeClr>
+                </a:solidFill>
+              </a:rPr>
+              <a:t>Works</a:t>
+            </a:r>
+          </a:p>
+          <a:p>
+            <a:r>
+              <a:rPr lang="en-US" sz="2000" dirty="0" err="1" smtClean="0">
+                <a:solidFill>
+                  <a:srgbClr val="FFFFFF"/>
+                </a:solidFill>
+              </a:rPr>
+              <a:t>dmorgant@thoughtworks.com</a:t>
+            </a:r>
+            <a:endParaRPr lang="en-US" sz="2000" dirty="0" smtClean="0">
+              <a:solidFill>
+                <a:srgbClr val="FFFFFF"/>
+              </a:solidFill>
+            </a:endParaRPr>
+          </a:p>
+          <a:p>
+            <a:r>
+              <a:rPr lang="en-US" sz="2000" dirty="0" smtClean="0">
+                <a:solidFill>
+                  <a:srgbClr val="FFFFFF"/>
+                </a:solidFill>
+              </a:rPr>
+              <a:t>http://</a:t>
+            </a:r>
+            <a:r>
+              <a:rPr lang="en-US" sz="2000" dirty="0" err="1" smtClean="0">
+                <a:solidFill>
+                  <a:srgbClr val="FFFFFF"/>
+                </a:solidFill>
+              </a:rPr>
+              <a:t>davidmorgantini.blogspot.co.uk</a:t>
+            </a:r>
+            <a:r>
+              <a:rPr lang="en-US" sz="2000" dirty="0" smtClean="0">
+                <a:solidFill>
+                  <a:srgbClr val="FFFFFF"/>
+                </a:solidFill>
+              </a:rPr>
+              <a:t>/</a:t>
+            </a:r>
+            <a:endParaRPr lang="en-US" sz="2000" dirty="0">
+              <a:solidFill>
+                <a:srgbClr val="FFFFFF"/>
+              </a:solidFill>
+            </a:endParaRPr>
+          </a:p>
+        </p:txBody>
+      </p:sp>
+      <p:pic>
+        <p:nvPicPr>
+          <p:cNvPr id="16" name="Picture 15"/>
+          <p:cNvPicPr>
+            <a:picLocks noChangeAspect="1"/>
+          </p:cNvPicPr>
+          <p:nvPr/>
+        </p:nvPicPr>
+        <p:blipFill>
+          <a:blip r:embed="rId4">
+            <a:biLevel thresh="50000"/>
+          </a:blip>
+          <a:stretch>
+            <a:fillRect/>
+          </a:stretch>
+        </p:blipFill>
+        <p:spPr>
+          <a:xfrm>
+            <a:off x="7436483" y="6209736"/>
+            <a:ext cx="521072" cy="293103"/>
+          </a:xfrm>
+          <a:prstGeom prst="rect">
+            <a:avLst/>
+          </a:prstGeom>
+        </p:spPr>
+      </p:pic>
+      <p:pic>
+        <p:nvPicPr>
+          <p:cNvPr id="17" name="Picture 16"/>
+          <p:cNvPicPr>
+            <a:picLocks noChangeAspect="1"/>
+          </p:cNvPicPr>
+          <p:nvPr/>
+        </p:nvPicPr>
+        <p:blipFill>
+          <a:blip r:embed="rId4">
+            <a:biLevel thresh="50000"/>
+          </a:blip>
+          <a:stretch>
+            <a:fillRect/>
+          </a:stretch>
+        </p:blipFill>
+        <p:spPr>
+          <a:xfrm>
+            <a:off x="85445" y="6209735"/>
+            <a:ext cx="521072" cy="293103"/>
+          </a:xfrm>
+          <a:prstGeom prst="rect">
+            <a:avLst/>
+          </a:prstGeom>
+        </p:spPr>
+      </p:pic>
+      <p:sp>
+        <p:nvSpPr>
+          <p:cNvPr id="20" name="Rectangle 19"/>
+          <p:cNvSpPr/>
+          <p:nvPr/>
+        </p:nvSpPr>
+        <p:spPr>
+          <a:xfrm>
+            <a:off x="552548" y="6133506"/>
+            <a:ext cx="1534833" cy="369332"/>
+          </a:xfrm>
+          <a:prstGeom prst="rect">
+            <a:avLst/>
+          </a:prstGeom>
+        </p:spPr>
+        <p:txBody>
+          <a:bodyPr wrap="none">
+            <a:spAutoFit/>
+          </a:bodyPr>
+          <a:lstStyle/>
+          <a:p>
+            <a:r>
+              <a:rPr lang="en-US" dirty="0" smtClean="0">
+                <a:solidFill>
+                  <a:srgbClr val="FFFFFF"/>
+                </a:solidFill>
+              </a:rPr>
+              <a:t>@</a:t>
+            </a:r>
+            <a:r>
+              <a:rPr lang="en-US" dirty="0" err="1" smtClean="0">
+                <a:solidFill>
+                  <a:srgbClr val="FFFFFF"/>
+                </a:solidFill>
+              </a:rPr>
+              <a:t>dmorgantini</a:t>
+            </a:r>
+            <a:endParaRPr lang="en-US" dirty="0">
+              <a:solidFill>
+                <a:srgbClr val="FFFFFF"/>
+              </a:solidFill>
+            </a:endParaRPr>
+          </a:p>
+        </p:txBody>
+      </p:sp>
+    </p:spTree>
+  </p:cSld>
+  <p:clrMapOvr>
+    <a:masterClrMapping/>
+  </p:clrMapOvr>
+  <p:timing>
+    <p:tnLst>
+      <p:par>
+        <p:cTn id="1" dur="indefinite" restart="never" nodeType="tmRoot"/>
+      </p:par>
+    </p:tnLst>
+  </p:timing>
+</p:sld>
+</file>
+
+<file path=ppt/slides/slide20.xml><?xml version="1.0" encoding="utf-8"?>
 <p:sld xmlns:a="http://schemas.openxmlformats.org/drawingml/2006/main" xmlns:r="http://schemas.openxmlformats.org/officeDocument/2006/relationships" xmlns:mc="http://schemas.openxmlformats.org/markup-compatibility/2006" xmlns:mv="urn:schemas-microsoft-com:mac:vml" xmlns:p="http://schemas.openxmlformats.org/presentationml/2006/main" mc:Ignorable="mv" mc:PreserveAttributes="mv:*">
   <p:cSld>
     <p:spTree>
@@ -17329,679 +18297,7 @@
 </p:sld>
 </file>
 
-<file path=ppt/slides/slide2.xml><?xml version="1.0" encoding="utf-8"?>
-<p:sld xmlns:a="http://schemas.openxmlformats.org/drawingml/2006/main" xmlns:r="http://schemas.openxmlformats.org/officeDocument/2006/relationships" xmlns:mc="http://schemas.openxmlformats.org/markup-compatibility/2006" xmlns:mv="urn:schemas-microsoft-com:mac:vml" xmlns:p="http://schemas.openxmlformats.org/presentationml/2006/main" mc:Ignorable="mv" mc:PreserveAttributes="mv:*">
-  <p:cSld>
-    <p:spTree>
-      <p:nvGrpSpPr>
-        <p:cNvPr id="1" name=""/>
-        <p:cNvGrpSpPr/>
-        <p:nvPr/>
-      </p:nvGrpSpPr>
-      <p:grpSpPr>
-        <a:xfrm>
-          <a:off x="0" y="0"/>
-          <a:ext cx="0" cy="0"/>
-          <a:chOff x="0" y="0"/>
-          <a:chExt cx="0" cy="0"/>
-        </a:xfrm>
-      </p:grpSpPr>
-      <p:sp>
-        <p:nvSpPr>
-          <p:cNvPr id="4" name="TextBox 3"/>
-          <p:cNvSpPr txBox="1"/>
-          <p:nvPr/>
-        </p:nvSpPr>
-        <p:spPr>
-          <a:xfrm>
-            <a:off x="2766477" y="287674"/>
-            <a:ext cx="2994680" cy="707886"/>
-          </a:xfrm>
-          <a:prstGeom prst="rect">
-            <a:avLst/>
-          </a:prstGeom>
-          <a:noFill/>
-        </p:spPr>
-        <p:txBody>
-          <a:bodyPr wrap="none" rtlCol="0">
-            <a:spAutoFit/>
-          </a:bodyPr>
-          <a:lstStyle/>
-          <a:p>
-            <a:r>
-              <a:rPr lang="en-US" sz="4000" b="1" dirty="0" smtClean="0">
-                <a:solidFill>
-                  <a:schemeClr val="bg1"/>
-                </a:solidFill>
-                <a:latin typeface="+mj-lt"/>
-                <a:cs typeface="Arial Black"/>
-              </a:rPr>
-              <a:t>Who </a:t>
-            </a:r>
-            <a:r>
-              <a:rPr lang="en-US" sz="4000" b="1" dirty="0" smtClean="0">
-                <a:solidFill>
-                  <a:schemeClr val="bg1">
-                    <a:lumMod val="50000"/>
-                  </a:schemeClr>
-                </a:solidFill>
-                <a:latin typeface="+mj-lt"/>
-                <a:cs typeface="Arial Black"/>
-              </a:rPr>
-              <a:t>are we?</a:t>
-            </a:r>
-            <a:endParaRPr lang="en-US" sz="4000" b="1" dirty="0">
-              <a:solidFill>
-                <a:schemeClr val="bg1">
-                  <a:lumMod val="50000"/>
-                </a:schemeClr>
-              </a:solidFill>
-              <a:latin typeface="+mj-lt"/>
-              <a:cs typeface="Arial Black"/>
-            </a:endParaRPr>
-          </a:p>
-        </p:txBody>
-      </p:sp>
-      <p:sp>
-        <p:nvSpPr>
-          <p:cNvPr id="5" name="TextBox 4"/>
-          <p:cNvSpPr txBox="1"/>
-          <p:nvPr/>
-        </p:nvSpPr>
-        <p:spPr>
-          <a:xfrm>
-            <a:off x="6034075" y="4275173"/>
-            <a:ext cx="2905763" cy="707886"/>
-          </a:xfrm>
-          <a:prstGeom prst="rect">
-            <a:avLst/>
-          </a:prstGeom>
-          <a:noFill/>
-        </p:spPr>
-        <p:txBody>
-          <a:bodyPr wrap="none" rtlCol="0">
-            <a:spAutoFit/>
-          </a:bodyPr>
-          <a:lstStyle/>
-          <a:p>
-            <a:r>
-              <a:rPr lang="en-US" sz="4000" b="1" dirty="0" smtClean="0">
-                <a:solidFill>
-                  <a:schemeClr val="bg1"/>
-                </a:solidFill>
-              </a:rPr>
-              <a:t>Akash </a:t>
-            </a:r>
-            <a:r>
-              <a:rPr lang="en-US" sz="4000" b="1" dirty="0" err="1" smtClean="0">
-                <a:solidFill>
-                  <a:schemeClr val="bg1">
-                    <a:lumMod val="50000"/>
-                  </a:schemeClr>
-                </a:solidFill>
-              </a:rPr>
-              <a:t>Bhalla</a:t>
-            </a:r>
-            <a:endParaRPr lang="en-US" sz="4000" b="1" dirty="0">
-              <a:solidFill>
-                <a:schemeClr val="bg1">
-                  <a:lumMod val="50000"/>
-                </a:schemeClr>
-              </a:solidFill>
-            </a:endParaRPr>
-          </a:p>
-        </p:txBody>
-      </p:sp>
-      <p:grpSp>
-        <p:nvGrpSpPr>
-          <p:cNvPr id="9" name="Group 8"/>
-          <p:cNvGrpSpPr/>
-          <p:nvPr/>
-        </p:nvGrpSpPr>
-        <p:grpSpPr>
-          <a:xfrm rot="20236626">
-            <a:off x="5034530" y="883651"/>
-            <a:ext cx="2808996" cy="3078659"/>
-            <a:chOff x="644769" y="1817077"/>
-            <a:chExt cx="2442308" cy="2676769"/>
-          </a:xfrm>
-          <a:effectLst>
-            <a:outerShdw blurRad="50800" dist="38100" dir="2700000" algn="tl" rotWithShape="0">
-              <a:srgbClr val="000000">
-                <a:alpha val="43000"/>
-              </a:srgbClr>
-            </a:outerShdw>
-          </a:effectLst>
-        </p:grpSpPr>
-        <p:sp>
-          <p:nvSpPr>
-            <p:cNvPr id="7" name="Rectangle 6"/>
-            <p:cNvSpPr/>
-            <p:nvPr/>
-          </p:nvSpPr>
-          <p:spPr>
-            <a:xfrm>
-              <a:off x="644769" y="1817077"/>
-              <a:ext cx="2442308" cy="2676769"/>
-            </a:xfrm>
-            <a:prstGeom prst="rect">
-              <a:avLst/>
-            </a:prstGeom>
-            <a:solidFill>
-              <a:schemeClr val="bg1"/>
-            </a:solidFill>
-            <a:ln>
-              <a:noFill/>
-            </a:ln>
-            <a:effectLst/>
-          </p:spPr>
-          <p:style>
-            <a:lnRef idx="1">
-              <a:schemeClr val="accent1"/>
-            </a:lnRef>
-            <a:fillRef idx="3">
-              <a:schemeClr val="accent1"/>
-            </a:fillRef>
-            <a:effectRef idx="2">
-              <a:schemeClr val="accent1"/>
-            </a:effectRef>
-            <a:fontRef idx="minor">
-              <a:schemeClr val="lt1"/>
-            </a:fontRef>
-          </p:style>
-          <p:txBody>
-            <a:bodyPr rtlCol="0" anchor="ctr"/>
-            <a:lstStyle/>
-            <a:p>
-              <a:pPr algn="ctr"/>
-              <a:endParaRPr lang="en-US"/>
-            </a:p>
-          </p:txBody>
-        </p:sp>
-        <p:pic>
-          <p:nvPicPr>
-            <p:cNvPr id="8" name="Picture 7"/>
-            <p:cNvPicPr>
-              <a:picLocks noChangeAspect="1"/>
-            </p:cNvPicPr>
-            <p:nvPr/>
-          </p:nvPicPr>
-          <p:blipFill>
-            <a:blip r:embed="rId2"/>
-            <a:stretch>
-              <a:fillRect/>
-            </a:stretch>
-          </p:blipFill>
-          <p:spPr>
-            <a:xfrm>
-              <a:off x="771764" y="1934309"/>
-              <a:ext cx="2178543" cy="2178543"/>
-            </a:xfrm>
-            <a:prstGeom prst="rect">
-              <a:avLst/>
-            </a:prstGeom>
-            <a:ln w="15875">
-              <a:solidFill>
-                <a:schemeClr val="tx1"/>
-              </a:solidFill>
-            </a:ln>
-          </p:spPr>
-        </p:pic>
-      </p:grpSp>
-      <p:grpSp>
-        <p:nvGrpSpPr>
-          <p:cNvPr id="14" name="Group 13"/>
-          <p:cNvGrpSpPr/>
-          <p:nvPr/>
-        </p:nvGrpSpPr>
-        <p:grpSpPr>
-          <a:xfrm rot="1257303">
-            <a:off x="842166" y="898690"/>
-            <a:ext cx="2873532" cy="3143314"/>
-            <a:chOff x="5778663" y="1817077"/>
-            <a:chExt cx="2447029" cy="2676769"/>
-          </a:xfrm>
-          <a:effectLst>
-            <a:outerShdw blurRad="50800" dist="38100" dir="2700000" algn="tl" rotWithShape="0">
-              <a:srgbClr val="000000">
-                <a:alpha val="43000"/>
-              </a:srgbClr>
-            </a:outerShdw>
-          </a:effectLst>
-        </p:grpSpPr>
-        <p:sp>
-          <p:nvSpPr>
-            <p:cNvPr id="11" name="Rectangle 10"/>
-            <p:cNvSpPr/>
-            <p:nvPr/>
-          </p:nvSpPr>
-          <p:spPr>
-            <a:xfrm>
-              <a:off x="5778663" y="1817077"/>
-              <a:ext cx="2447029" cy="2676769"/>
-            </a:xfrm>
-            <a:prstGeom prst="rect">
-              <a:avLst/>
-            </a:prstGeom>
-            <a:solidFill>
-              <a:schemeClr val="bg1"/>
-            </a:solidFill>
-            <a:ln>
-              <a:noFill/>
-            </a:ln>
-            <a:effectLst/>
-          </p:spPr>
-          <p:style>
-            <a:lnRef idx="1">
-              <a:schemeClr val="accent1"/>
-            </a:lnRef>
-            <a:fillRef idx="3">
-              <a:schemeClr val="accent1"/>
-            </a:fillRef>
-            <a:effectRef idx="2">
-              <a:schemeClr val="accent1"/>
-            </a:effectRef>
-            <a:fontRef idx="minor">
-              <a:schemeClr val="lt1"/>
-            </a:fontRef>
-          </p:style>
-          <p:txBody>
-            <a:bodyPr rtlCol="0" anchor="ctr"/>
-            <a:lstStyle/>
-            <a:p>
-              <a:pPr algn="ctr"/>
-              <a:endParaRPr lang="en-US"/>
-            </a:p>
-          </p:txBody>
-        </p:sp>
-        <p:pic>
-          <p:nvPicPr>
-            <p:cNvPr id="13" name="Picture 12"/>
-            <p:cNvPicPr>
-              <a:picLocks noChangeAspect="1"/>
-            </p:cNvPicPr>
-            <p:nvPr/>
-          </p:nvPicPr>
-          <p:blipFill>
-            <a:blip r:embed="rId3"/>
-            <a:stretch>
-              <a:fillRect/>
-            </a:stretch>
-          </p:blipFill>
-          <p:spPr>
-            <a:xfrm>
-              <a:off x="5907477" y="1937354"/>
-              <a:ext cx="2178543" cy="2178543"/>
-            </a:xfrm>
-            <a:prstGeom prst="rect">
-              <a:avLst/>
-            </a:prstGeom>
-            <a:ln w="15875">
-              <a:solidFill>
-                <a:schemeClr val="tx1"/>
-              </a:solidFill>
-            </a:ln>
-          </p:spPr>
-        </p:pic>
-      </p:grpSp>
-      <p:sp>
-        <p:nvSpPr>
-          <p:cNvPr id="6" name="TextBox 5"/>
-          <p:cNvSpPr txBox="1"/>
-          <p:nvPr/>
-        </p:nvSpPr>
-        <p:spPr>
-          <a:xfrm>
-            <a:off x="124700" y="4275173"/>
-            <a:ext cx="3878836" cy="707886"/>
-          </a:xfrm>
-          <a:prstGeom prst="rect">
-            <a:avLst/>
-          </a:prstGeom>
-          <a:noFill/>
-        </p:spPr>
-        <p:txBody>
-          <a:bodyPr wrap="none" rtlCol="0">
-            <a:spAutoFit/>
-          </a:bodyPr>
-          <a:lstStyle/>
-          <a:p>
-            <a:r>
-              <a:rPr lang="en-US" sz="4000" b="1" dirty="0" smtClean="0">
-                <a:solidFill>
-                  <a:schemeClr val="bg1"/>
-                </a:solidFill>
-              </a:rPr>
-              <a:t>David </a:t>
-            </a:r>
-            <a:r>
-              <a:rPr lang="en-US" sz="4000" b="1" dirty="0" err="1" smtClean="0">
-                <a:solidFill>
-                  <a:schemeClr val="bg1">
-                    <a:lumMod val="50000"/>
-                  </a:schemeClr>
-                </a:solidFill>
-              </a:rPr>
-              <a:t>Morgantini</a:t>
-            </a:r>
-            <a:endParaRPr lang="en-US" sz="4000" b="1" dirty="0">
-              <a:solidFill>
-                <a:schemeClr val="bg1">
-                  <a:lumMod val="50000"/>
-                </a:schemeClr>
-              </a:solidFill>
-            </a:endParaRPr>
-          </a:p>
-        </p:txBody>
-      </p:sp>
-      <p:sp>
-        <p:nvSpPr>
-          <p:cNvPr id="18" name="TextBox 17"/>
-          <p:cNvSpPr txBox="1"/>
-          <p:nvPr/>
-        </p:nvSpPr>
-        <p:spPr>
-          <a:xfrm>
-            <a:off x="4909045" y="5194073"/>
-            <a:ext cx="4109343" cy="1323439"/>
-          </a:xfrm>
-          <a:prstGeom prst="rect">
-            <a:avLst/>
-          </a:prstGeom>
-          <a:noFill/>
-        </p:spPr>
-        <p:txBody>
-          <a:bodyPr wrap="none" rtlCol="0">
-            <a:spAutoFit/>
-          </a:bodyPr>
-          <a:lstStyle/>
-          <a:p>
-            <a:pPr algn="r"/>
-            <a:r>
-              <a:rPr lang="en-US" sz="2000" dirty="0" smtClean="0">
-                <a:solidFill>
-                  <a:srgbClr val="FFFFFF"/>
-                </a:solidFill>
-              </a:rPr>
-              <a:t>Software developer @ Thought</a:t>
-            </a:r>
-            <a:r>
-              <a:rPr lang="en-US" sz="2000" b="1" dirty="0" smtClean="0">
-                <a:solidFill>
-                  <a:schemeClr val="bg1">
-                    <a:lumMod val="65000"/>
-                  </a:schemeClr>
-                </a:solidFill>
-              </a:rPr>
-              <a:t>Works</a:t>
-            </a:r>
-          </a:p>
-          <a:p>
-            <a:pPr algn="r"/>
-            <a:r>
-              <a:rPr lang="en-US" sz="2000" dirty="0" smtClean="0">
-                <a:solidFill>
-                  <a:srgbClr val="FFFFFF"/>
-                </a:solidFill>
-              </a:rPr>
-              <a:t>akash@thoughtworks.com</a:t>
-            </a:r>
-          </a:p>
-          <a:p>
-            <a:pPr algn="r"/>
-            <a:r>
-              <a:rPr lang="en-US" sz="2000" dirty="0" smtClean="0">
-                <a:solidFill>
-                  <a:srgbClr val="FFFFFF"/>
-                </a:solidFill>
-              </a:rPr>
-              <a:t>http://</a:t>
-            </a:r>
-            <a:r>
-              <a:rPr lang="en-US" sz="2000" dirty="0" err="1" smtClean="0">
-                <a:solidFill>
-                  <a:srgbClr val="FFFFFF"/>
-                </a:solidFill>
-              </a:rPr>
-              <a:t>www.akashb.com</a:t>
-            </a:r>
-            <a:r>
-              <a:rPr lang="en-US" sz="2000" dirty="0" smtClean="0">
-                <a:solidFill>
-                  <a:srgbClr val="FFFFFF"/>
-                </a:solidFill>
-              </a:rPr>
-              <a:t>/blog</a:t>
-            </a:r>
-          </a:p>
-          <a:p>
-            <a:pPr algn="r"/>
-            <a:r>
-              <a:rPr lang="en-US" sz="2000" dirty="0" smtClean="0">
-                <a:solidFill>
-                  <a:srgbClr val="FFFFFF"/>
-                </a:solidFill>
-              </a:rPr>
-              <a:t>@</a:t>
-            </a:r>
-            <a:r>
-              <a:rPr lang="en-US" sz="2000" dirty="0" err="1" smtClean="0">
-                <a:solidFill>
-                  <a:srgbClr val="FFFFFF"/>
-                </a:solidFill>
-              </a:rPr>
-              <a:t>akashb</a:t>
-            </a:r>
-            <a:endParaRPr lang="en-US" sz="2000" dirty="0">
-              <a:solidFill>
-                <a:srgbClr val="FFFFFF"/>
-              </a:solidFill>
-            </a:endParaRPr>
-          </a:p>
-        </p:txBody>
-      </p:sp>
-      <p:sp>
-        <p:nvSpPr>
-          <p:cNvPr id="19" name="TextBox 18"/>
-          <p:cNvSpPr txBox="1"/>
-          <p:nvPr/>
-        </p:nvSpPr>
-        <p:spPr>
-          <a:xfrm>
-            <a:off x="124700" y="5194073"/>
-            <a:ext cx="4275529" cy="1015663"/>
-          </a:xfrm>
-          <a:prstGeom prst="rect">
-            <a:avLst/>
-          </a:prstGeom>
-          <a:noFill/>
-        </p:spPr>
-        <p:txBody>
-          <a:bodyPr wrap="none" rtlCol="0">
-            <a:spAutoFit/>
-          </a:bodyPr>
-          <a:lstStyle/>
-          <a:p>
-            <a:r>
-              <a:rPr lang="en-US" sz="2000" dirty="0" smtClean="0">
-                <a:solidFill>
-                  <a:srgbClr val="FFFFFF"/>
-                </a:solidFill>
-              </a:rPr>
-              <a:t>Software developer @ Thought</a:t>
-            </a:r>
-            <a:r>
-              <a:rPr lang="en-US" sz="2000" b="1" dirty="0" smtClean="0">
-                <a:solidFill>
-                  <a:schemeClr val="bg1">
-                    <a:lumMod val="65000"/>
-                  </a:schemeClr>
-                </a:solidFill>
-              </a:rPr>
-              <a:t>Works</a:t>
-            </a:r>
-          </a:p>
-          <a:p>
-            <a:r>
-              <a:rPr lang="en-US" sz="2000" dirty="0" err="1" smtClean="0">
-                <a:solidFill>
-                  <a:srgbClr val="FFFFFF"/>
-                </a:solidFill>
-              </a:rPr>
-              <a:t>dmorgant@thoughtworks.com</a:t>
-            </a:r>
-            <a:endParaRPr lang="en-US" sz="2000" dirty="0" smtClean="0">
-              <a:solidFill>
-                <a:srgbClr val="FFFFFF"/>
-              </a:solidFill>
-            </a:endParaRPr>
-          </a:p>
-          <a:p>
-            <a:r>
-              <a:rPr lang="en-US" sz="2000" dirty="0" smtClean="0">
-                <a:solidFill>
-                  <a:srgbClr val="FFFFFF"/>
-                </a:solidFill>
-              </a:rPr>
-              <a:t>http://</a:t>
-            </a:r>
-            <a:r>
-              <a:rPr lang="en-US" sz="2000" dirty="0" err="1" smtClean="0">
-                <a:solidFill>
-                  <a:srgbClr val="FFFFFF"/>
-                </a:solidFill>
-              </a:rPr>
-              <a:t>davidmorgantini.blogspot.co.uk</a:t>
-            </a:r>
-            <a:r>
-              <a:rPr lang="en-US" sz="2000" dirty="0" smtClean="0">
-                <a:solidFill>
-                  <a:srgbClr val="FFFFFF"/>
-                </a:solidFill>
-              </a:rPr>
-              <a:t>/</a:t>
-            </a:r>
-            <a:endParaRPr lang="en-US" sz="2000" dirty="0">
-              <a:solidFill>
-                <a:srgbClr val="FFFFFF"/>
-              </a:solidFill>
-            </a:endParaRPr>
-          </a:p>
-        </p:txBody>
-      </p:sp>
-      <p:pic>
-        <p:nvPicPr>
-          <p:cNvPr id="16" name="Picture 15"/>
-          <p:cNvPicPr>
-            <a:picLocks noChangeAspect="1"/>
-          </p:cNvPicPr>
-          <p:nvPr/>
-        </p:nvPicPr>
-        <p:blipFill>
-          <a:blip r:embed="rId4">
-            <a:biLevel thresh="50000"/>
-          </a:blip>
-          <a:stretch>
-            <a:fillRect/>
-          </a:stretch>
-        </p:blipFill>
-        <p:spPr>
-          <a:xfrm>
-            <a:off x="7436483" y="6209736"/>
-            <a:ext cx="521072" cy="293103"/>
-          </a:xfrm>
-          <a:prstGeom prst="rect">
-            <a:avLst/>
-          </a:prstGeom>
-        </p:spPr>
-      </p:pic>
-      <p:pic>
-        <p:nvPicPr>
-          <p:cNvPr id="17" name="Picture 16"/>
-          <p:cNvPicPr>
-            <a:picLocks noChangeAspect="1"/>
-          </p:cNvPicPr>
-          <p:nvPr/>
-        </p:nvPicPr>
-        <p:blipFill>
-          <a:blip r:embed="rId4">
-            <a:biLevel thresh="50000"/>
-          </a:blip>
-          <a:stretch>
-            <a:fillRect/>
-          </a:stretch>
-        </p:blipFill>
-        <p:spPr>
-          <a:xfrm>
-            <a:off x="85445" y="6209735"/>
-            <a:ext cx="521072" cy="293103"/>
-          </a:xfrm>
-          <a:prstGeom prst="rect">
-            <a:avLst/>
-          </a:prstGeom>
-        </p:spPr>
-      </p:pic>
-      <p:sp>
-        <p:nvSpPr>
-          <p:cNvPr id="20" name="Rectangle 19"/>
-          <p:cNvSpPr/>
-          <p:nvPr/>
-        </p:nvSpPr>
-        <p:spPr>
-          <a:xfrm>
-            <a:off x="552548" y="6133506"/>
-            <a:ext cx="1534833" cy="369332"/>
-          </a:xfrm>
-          <a:prstGeom prst="rect">
-            <a:avLst/>
-          </a:prstGeom>
-        </p:spPr>
-        <p:txBody>
-          <a:bodyPr wrap="none">
-            <a:spAutoFit/>
-          </a:bodyPr>
-          <a:lstStyle/>
-          <a:p>
-            <a:r>
-              <a:rPr lang="en-US" dirty="0" smtClean="0">
-                <a:solidFill>
-                  <a:srgbClr val="FFFFFF"/>
-                </a:solidFill>
-              </a:rPr>
-              <a:t>@</a:t>
-            </a:r>
-            <a:r>
-              <a:rPr lang="en-US" dirty="0" err="1" smtClean="0">
-                <a:solidFill>
-                  <a:srgbClr val="FFFFFF"/>
-                </a:solidFill>
-              </a:rPr>
-              <a:t>dmorgantini</a:t>
-            </a:r>
-            <a:endParaRPr lang="en-US" dirty="0">
-              <a:solidFill>
-                <a:srgbClr val="FFFFFF"/>
-              </a:solidFill>
-            </a:endParaRPr>
-          </a:p>
-        </p:txBody>
-      </p:sp>
-    </p:spTree>
-  </p:cSld>
-  <p:clrMapOvr>
-    <a:masterClrMapping/>
-  </p:clrMapOvr>
-  <p:timing>
-    <p:tnLst>
-      <p:par>
-        <p:cTn id="1" dur="indefinite" restart="never" nodeType="tmRoot"/>
-      </p:par>
-    </p:tnLst>
-  </p:timing>
-</p:sld>
-</file>
-
-<file path=ppt/slides/slide20.xml><?xml version="1.0" encoding="utf-8"?>
+<file path=ppt/slides/slide21.xml><?xml version="1.0" encoding="utf-8"?>
 <p:sld xmlns:a="http://schemas.openxmlformats.org/drawingml/2006/main" xmlns:r="http://schemas.openxmlformats.org/officeDocument/2006/relationships" xmlns:mc="http://schemas.openxmlformats.org/markup-compatibility/2006" xmlns:mv="urn:schemas-microsoft-com:mac:vml" xmlns:p="http://schemas.openxmlformats.org/presentationml/2006/main" mc:Ignorable="mv" mc:PreserveAttributes="mv:*">
   <p:cSld>
     <p:spTree>
@@ -22020,7 +22316,7 @@
 </p:sld>
 </file>
 
-<file path=ppt/slides/slide21.xml><?xml version="1.0" encoding="utf-8"?>
+<file path=ppt/slides/slide22.xml><?xml version="1.0" encoding="utf-8"?>
 <p:sld xmlns:a="http://schemas.openxmlformats.org/drawingml/2006/main" xmlns:r="http://schemas.openxmlformats.org/officeDocument/2006/relationships" xmlns:mc="http://schemas.openxmlformats.org/markup-compatibility/2006" xmlns:mv="urn:schemas-microsoft-com:mac:vml" xmlns:p="http://schemas.openxmlformats.org/presentationml/2006/main" mc:Ignorable="mv" mc:PreserveAttributes="mv:*">
   <p:cSld>
     <p:bg>
@@ -22320,7 +22616,7 @@
 </p:sld>
 </file>
 
-<file path=ppt/slides/slide22.xml><?xml version="1.0" encoding="utf-8"?>
+<file path=ppt/slides/slide23.xml><?xml version="1.0" encoding="utf-8"?>
 <p:sld xmlns:a="http://schemas.openxmlformats.org/drawingml/2006/main" xmlns:r="http://schemas.openxmlformats.org/officeDocument/2006/relationships" xmlns:mc="http://schemas.openxmlformats.org/markup-compatibility/2006" xmlns:mv="urn:schemas-microsoft-com:mac:vml" xmlns:p="http://schemas.openxmlformats.org/presentationml/2006/main" mc:Ignorable="mv" mc:PreserveAttributes="mv:*">
   <p:cSld>
     <p:spTree>
@@ -26339,7 +26635,7 @@
 </p:sld>
 </file>
 
-<file path=ppt/slides/slide23.xml><?xml version="1.0" encoding="utf-8"?>
+<file path=ppt/slides/slide24.xml><?xml version="1.0" encoding="utf-8"?>
 <p:sld xmlns:a="http://schemas.openxmlformats.org/drawingml/2006/main" xmlns:r="http://schemas.openxmlformats.org/officeDocument/2006/relationships" xmlns:mc="http://schemas.openxmlformats.org/markup-compatibility/2006" xmlns:mv="urn:schemas-microsoft-com:mac:vml" xmlns:p="http://schemas.openxmlformats.org/presentationml/2006/main" mc:Ignorable="mv" mc:PreserveAttributes="mv:*">
   <p:cSld>
     <p:bg>
@@ -26403,7 +26699,7 @@
 </p:sld>
 </file>
 
-<file path=ppt/slides/slide24.xml><?xml version="1.0" encoding="utf-8"?>
+<file path=ppt/slides/slide25.xml><?xml version="1.0" encoding="utf-8"?>
 <p:sld xmlns:a="http://schemas.openxmlformats.org/drawingml/2006/main" xmlns:r="http://schemas.openxmlformats.org/officeDocument/2006/relationships" xmlns:mc="http://schemas.openxmlformats.org/markup-compatibility/2006" xmlns:mv="urn:schemas-microsoft-com:mac:vml" xmlns:p="http://schemas.openxmlformats.org/presentationml/2006/main" mc:Ignorable="mv" mc:PreserveAttributes="mv:*">
   <p:cSld>
     <p:spTree>
@@ -30428,7 +30724,7 @@
 </p:sld>
 </file>
 
-<file path=ppt/slides/slide25.xml><?xml version="1.0" encoding="utf-8"?>
+<file path=ppt/slides/slide26.xml><?xml version="1.0" encoding="utf-8"?>
 <p:sld xmlns:a="http://schemas.openxmlformats.org/drawingml/2006/main" xmlns:r="http://schemas.openxmlformats.org/officeDocument/2006/relationships" xmlns:mc="http://schemas.openxmlformats.org/markup-compatibility/2006" xmlns:mv="urn:schemas-microsoft-com:mac:vml" xmlns:p="http://schemas.openxmlformats.org/presentationml/2006/main" mc:Ignorable="mv" mc:PreserveAttributes="mv:*">
   <p:cSld>
     <p:bg>
@@ -30614,11 +30910,13 @@
           <a:prstGeom prst="rect">
             <a:avLst/>
           </a:prstGeom>
-          <a:noFill/>
+          <a:solidFill>
+            <a:schemeClr val="bg1">
+              <a:lumMod val="85000"/>
+            </a:schemeClr>
+          </a:solidFill>
           <a:ln>
-            <a:solidFill>
-              <a:schemeClr val="tx1"/>
-            </a:solidFill>
+            <a:noFill/>
           </a:ln>
           <a:effectLst/>
         </p:spPr>
@@ -30677,14 +30975,14 @@
       </p:sp>
       <p:sp>
         <p:nvSpPr>
-          <p:cNvPr id="8" name="TextBox 7"/>
+          <p:cNvPr id="9" name="TextBox 8"/>
           <p:cNvSpPr txBox="1"/>
           <p:nvPr/>
         </p:nvSpPr>
         <p:spPr>
           <a:xfrm>
-            <a:off x="2210121" y="2280121"/>
-            <a:ext cx="301660" cy="369332"/>
+            <a:off x="873201" y="2736861"/>
+            <a:ext cx="1140907" cy="646331"/>
           </a:xfrm>
           <a:prstGeom prst="rect">
             <a:avLst/>
@@ -30699,37 +30997,17 @@
           <a:p>
             <a:r>
               <a:rPr lang="en-US" dirty="0" smtClean="0"/>
-              <a:t>3</a:t>
+              <a:t>Story </a:t>
             </a:r>
-            <a:endParaRPr lang="en-US" dirty="0"/>
+            <a:r>
+              <a:rPr lang="en-US" dirty="0" smtClean="0"/>
+              <a:t>title</a:t>
+            </a:r>
           </a:p>
-        </p:txBody>
-      </p:sp>
-      <p:sp>
-        <p:nvSpPr>
-          <p:cNvPr id="9" name="TextBox 8"/>
-          <p:cNvSpPr txBox="1"/>
-          <p:nvPr/>
-        </p:nvSpPr>
-        <p:spPr>
-          <a:xfrm>
-            <a:off x="873201" y="2736861"/>
-            <a:ext cx="1099542" cy="369332"/>
-          </a:xfrm>
-          <a:prstGeom prst="rect">
-            <a:avLst/>
-          </a:prstGeom>
-          <a:noFill/>
-        </p:spPr>
-        <p:txBody>
-          <a:bodyPr wrap="none" rtlCol="0">
-            <a:spAutoFit/>
-          </a:bodyPr>
-          <a:lstStyle/>
           <a:p>
             <a:r>
               <a:rPr lang="en-US" dirty="0" smtClean="0"/>
-              <a:t>Story title</a:t>
+              <a:t>(estimate)</a:t>
             </a:r>
             <a:endParaRPr lang="en-US" dirty="0"/>
           </a:p>
@@ -30750,7 +31028,7 @@
 </p:sld>
 </file>
 
-<file path=ppt/slides/slide26.xml><?xml version="1.0" encoding="utf-8"?>
+<file path=ppt/slides/slide27.xml><?xml version="1.0" encoding="utf-8"?>
 <p:sld xmlns:a="http://schemas.openxmlformats.org/drawingml/2006/main" xmlns:r="http://schemas.openxmlformats.org/officeDocument/2006/relationships" xmlns:mc="http://schemas.openxmlformats.org/markup-compatibility/2006" xmlns:mv="urn:schemas-microsoft-com:mac:vml" xmlns:p="http://schemas.openxmlformats.org/presentationml/2006/main" mc:Ignorable="mv" mc:PreserveAttributes="mv:*">
   <p:cSld>
     <p:spTree>
@@ -34766,7 +35044,7 @@
 </p:sld>
 </file>
 
-<file path=ppt/slides/slide27.xml><?xml version="1.0" encoding="utf-8"?>
+<file path=ppt/slides/slide28.xml><?xml version="1.0" encoding="utf-8"?>
 <p:sld xmlns:a="http://schemas.openxmlformats.org/drawingml/2006/main" xmlns:r="http://schemas.openxmlformats.org/officeDocument/2006/relationships" xmlns:mc="http://schemas.openxmlformats.org/markup-compatibility/2006" xmlns:mv="urn:schemas-microsoft-com:mac:vml" xmlns:p="http://schemas.openxmlformats.org/presentationml/2006/main" mc:Ignorable="mv" mc:PreserveAttributes="mv:*">
   <p:cSld>
     <p:spTree>
@@ -38782,7 +39060,7 @@
 </p:sld>
 </file>
 
-<file path=ppt/slides/slide28.xml><?xml version="1.0" encoding="utf-8"?>
+<file path=ppt/slides/slide29.xml><?xml version="1.0" encoding="utf-8"?>
 <p:sld xmlns:a="http://schemas.openxmlformats.org/drawingml/2006/main" xmlns:r="http://schemas.openxmlformats.org/officeDocument/2006/relationships" xmlns:mc="http://schemas.openxmlformats.org/markup-compatibility/2006" xmlns:mv="urn:schemas-microsoft-com:mac:vml" xmlns:p="http://schemas.openxmlformats.org/presentationml/2006/main" mc:Ignorable="mv" mc:PreserveAttributes="mv:*">
   <p:cSld>
     <p:bg>
@@ -38831,38 +39109,6 @@
           </a:prstGeom>
         </p:spPr>
       </p:pic>
-    </p:spTree>
-  </p:cSld>
-  <p:clrMapOvr>
-    <a:masterClrMapping/>
-  </p:clrMapOvr>
-  <p:timing>
-    <p:tnLst>
-      <p:par>
-        <p:cTn id="1" dur="indefinite" restart="never" nodeType="tmRoot"/>
-      </p:par>
-    </p:tnLst>
-  </p:timing>
-</p:sld>
-</file>
-
-<file path=ppt/slides/slide29.xml><?xml version="1.0" encoding="utf-8"?>
-<p:sld xmlns:a="http://schemas.openxmlformats.org/drawingml/2006/main" xmlns:r="http://schemas.openxmlformats.org/officeDocument/2006/relationships" xmlns:mc="http://schemas.openxmlformats.org/markup-compatibility/2006" xmlns:mv="urn:schemas-microsoft-com:mac:vml" xmlns:p="http://schemas.openxmlformats.org/presentationml/2006/main" mc:Ignorable="mv" mc:PreserveAttributes="mv:*">
-  <p:cSld>
-    <p:spTree>
-      <p:nvGrpSpPr>
-        <p:cNvPr id="1" name=""/>
-        <p:cNvGrpSpPr/>
-        <p:nvPr/>
-      </p:nvGrpSpPr>
-      <p:grpSpPr>
-        <a:xfrm>
-          <a:off x="0" y="0"/>
-          <a:ext cx="0" cy="0"/>
-          <a:chOff x="0" y="0"/>
-          <a:chExt cx="0" cy="0"/>
-        </a:xfrm>
-      </p:grpSpPr>
     </p:spTree>
   </p:cSld>
   <p:clrMapOvr>
@@ -39005,6 +39251,38 @@
           <a:chExt cx="0" cy="0"/>
         </a:xfrm>
       </p:grpSpPr>
+    </p:spTree>
+  </p:cSld>
+  <p:clrMapOvr>
+    <a:masterClrMapping/>
+  </p:clrMapOvr>
+  <p:timing>
+    <p:tnLst>
+      <p:par>
+        <p:cTn id="1" dur="indefinite" restart="never" nodeType="tmRoot"/>
+      </p:par>
+    </p:tnLst>
+  </p:timing>
+</p:sld>
+</file>
+
+<file path=ppt/slides/slide31.xml><?xml version="1.0" encoding="utf-8"?>
+<p:sld xmlns:a="http://schemas.openxmlformats.org/drawingml/2006/main" xmlns:r="http://schemas.openxmlformats.org/officeDocument/2006/relationships" xmlns:mc="http://schemas.openxmlformats.org/markup-compatibility/2006" xmlns:mv="urn:schemas-microsoft-com:mac:vml" xmlns:p="http://schemas.openxmlformats.org/presentationml/2006/main" mc:Ignorable="mv" mc:PreserveAttributes="mv:*">
+  <p:cSld>
+    <p:spTree>
+      <p:nvGrpSpPr>
+        <p:cNvPr id="1" name=""/>
+        <p:cNvGrpSpPr/>
+        <p:nvPr/>
+      </p:nvGrpSpPr>
+      <p:grpSpPr>
+        <a:xfrm>
+          <a:off x="0" y="0"/>
+          <a:ext cx="0" cy="0"/>
+          <a:chOff x="0" y="0"/>
+          <a:chExt cx="0" cy="0"/>
+        </a:xfrm>
+      </p:grpSpPr>
       <p:sp>
         <p:nvSpPr>
           <p:cNvPr id="2" name="TextBox 1"/>
@@ -39084,7 +39362,7 @@
 </p:sld>
 </file>
 
-<file path=ppt/slides/slide31.xml><?xml version="1.0" encoding="utf-8"?>
+<file path=ppt/slides/slide32.xml><?xml version="1.0" encoding="utf-8"?>
 <p:sld xmlns:a="http://schemas.openxmlformats.org/drawingml/2006/main" xmlns:r="http://schemas.openxmlformats.org/officeDocument/2006/relationships" xmlns:mc="http://schemas.openxmlformats.org/markup-compatibility/2006" xmlns:mv="urn:schemas-microsoft-com:mac:vml" xmlns:p="http://schemas.openxmlformats.org/presentationml/2006/main" mc:Ignorable="mv" mc:PreserveAttributes="mv:*">
   <p:cSld>
     <p:bg>
@@ -40642,7 +40920,7 @@
 </p:sld>
 </file>
 
-<file path=ppt/slides/slide32.xml><?xml version="1.0" encoding="utf-8"?>
+<file path=ppt/slides/slide33.xml><?xml version="1.0" encoding="utf-8"?>
 <p:sld xmlns:a="http://schemas.openxmlformats.org/drawingml/2006/main" xmlns:r="http://schemas.openxmlformats.org/officeDocument/2006/relationships" xmlns:mc="http://schemas.openxmlformats.org/markup-compatibility/2006" xmlns:mv="urn:schemas-microsoft-com:mac:vml" xmlns:p="http://schemas.openxmlformats.org/presentationml/2006/main" mc:Ignorable="mv" mc:PreserveAttributes="mv:*">
   <p:cSld>
     <p:spTree>
@@ -40721,7 +40999,7 @@
 </p:sld>
 </file>
 
-<file path=ppt/slides/slide33.xml><?xml version="1.0" encoding="utf-8"?>
+<file path=ppt/slides/slide34.xml><?xml version="1.0" encoding="utf-8"?>
 <p:sld xmlns:a="http://schemas.openxmlformats.org/drawingml/2006/main" xmlns:r="http://schemas.openxmlformats.org/officeDocument/2006/relationships" xmlns:mc="http://schemas.openxmlformats.org/markup-compatibility/2006" xmlns:mv="urn:schemas-microsoft-com:mac:vml" xmlns:p="http://schemas.openxmlformats.org/presentationml/2006/main" mc:Ignorable="mv" mc:PreserveAttributes="mv:*">
   <p:cSld>
     <p:spTree>
@@ -41109,7 +41387,7 @@
         <p:spPr>
           <a:xfrm>
             <a:off x="-72074" y="-209082"/>
-            <a:ext cx="8417689" cy="1862048"/>
+            <a:ext cx="4583306" cy="2400657"/>
           </a:xfrm>
           <a:prstGeom prst="rect">
             <a:avLst/>
@@ -41123,7 +41401,7 @@
           <a:lstStyle/>
           <a:p>
             <a:r>
-              <a:rPr lang="en-US" sz="11500" b="1" spc="-700" dirty="0" err="1" smtClean="0">
+              <a:rPr lang="en-US" sz="15000" b="1" spc="-1300" dirty="0" smtClean="0">
                 <a:solidFill>
                   <a:schemeClr val="bg1"/>
                 </a:solidFill>
@@ -41132,19 +41410,7 @@
               </a:rPr>
               <a:t>Drop</a:t>
             </a:r>
-            <a:r>
-              <a:rPr lang="en-US" sz="11500" b="1" spc="-700" dirty="0" err="1" smtClean="0">
-                <a:solidFill>
-                  <a:schemeClr val="bg1">
-                    <a:lumMod val="50000"/>
-                  </a:schemeClr>
-                </a:solidFill>
-                <a:latin typeface="Arial Black"/>
-                <a:cs typeface="Arial Black"/>
-              </a:rPr>
-              <a:t>wizard</a:t>
-            </a:r>
-            <a:endParaRPr lang="en-US" sz="3600" b="1" spc="-700" dirty="0">
+            <a:endParaRPr lang="en-US" sz="15000" b="1" spc="-1300" dirty="0">
               <a:solidFill>
                 <a:schemeClr val="bg1">
                   <a:lumMod val="50000"/>
@@ -41164,8 +41430,8 @@
         </p:nvSpPr>
         <p:spPr>
           <a:xfrm>
-            <a:off x="-12637" y="2165483"/>
-            <a:ext cx="7212231" cy="1862048"/>
+            <a:off x="-72074" y="2273078"/>
+            <a:ext cx="9058890" cy="2400657"/>
           </a:xfrm>
           <a:prstGeom prst="rect">
             <a:avLst/>
@@ -41179,7 +41445,7 @@
           <a:lstStyle/>
           <a:p>
             <a:r>
-              <a:rPr lang="en-US" sz="11500" b="1" spc="-700" dirty="0" err="1" smtClean="0">
+              <a:rPr lang="en-US" sz="15000" b="1" spc="-1300" dirty="0" err="1" smtClean="0">
                 <a:solidFill>
                   <a:schemeClr val="bg1"/>
                 </a:solidFill>
@@ -41189,7 +41455,7 @@
               <a:t>Mongo</a:t>
             </a:r>
             <a:r>
-              <a:rPr lang="en-US" sz="11500" b="1" spc="-700" dirty="0" err="1" smtClean="0">
+              <a:rPr lang="en-US" sz="15000" b="1" spc="-1300" dirty="0" err="1" smtClean="0">
                 <a:solidFill>
                   <a:srgbClr val="7F7F7F"/>
                 </a:solidFill>
@@ -41198,103 +41464,7 @@
               </a:rPr>
               <a:t>DB</a:t>
             </a:r>
-            <a:endParaRPr lang="en-US" sz="6000" b="1" spc="-700" dirty="0">
-              <a:solidFill>
-                <a:srgbClr val="7F7F7F"/>
-              </a:solidFill>
-              <a:latin typeface="Arial Black"/>
-              <a:cs typeface="Arial Black"/>
-            </a:endParaRPr>
-          </a:p>
-        </p:txBody>
-      </p:sp>
-      <p:sp>
-        <p:nvSpPr>
-          <p:cNvPr id="17" name="TextBox 16"/>
-          <p:cNvSpPr txBox="1"/>
-          <p:nvPr/>
-        </p:nvSpPr>
-        <p:spPr>
-          <a:xfrm>
-            <a:off x="-665" y="982447"/>
-            <a:ext cx="5147563" cy="1862048"/>
-          </a:xfrm>
-          <a:prstGeom prst="rect">
-            <a:avLst/>
-          </a:prstGeom>
-          <a:noFill/>
-        </p:spPr>
-        <p:txBody>
-          <a:bodyPr wrap="none" rtlCol="0">
-            <a:spAutoFit/>
-          </a:bodyPr>
-          <a:lstStyle/>
-          <a:p>
-            <a:r>
-              <a:rPr lang="en-US" sz="11500" b="1" spc="-700" dirty="0" smtClean="0">
-                <a:solidFill>
-                  <a:schemeClr val="bg1"/>
-                </a:solidFill>
-                <a:latin typeface="Arial Black"/>
-                <a:cs typeface="Arial Black"/>
-              </a:rPr>
-              <a:t>Jersey</a:t>
-            </a:r>
-            <a:endParaRPr lang="en-US" sz="3600" b="1" spc="-700" dirty="0">
-              <a:solidFill>
-                <a:schemeClr val="bg1">
-                  <a:lumMod val="50000"/>
-                </a:schemeClr>
-              </a:solidFill>
-              <a:latin typeface="Arial Black"/>
-              <a:cs typeface="Arial Black"/>
-            </a:endParaRPr>
-          </a:p>
-        </p:txBody>
-      </p:sp>
-      <p:sp>
-        <p:nvSpPr>
-          <p:cNvPr id="20" name="TextBox 19"/>
-          <p:cNvSpPr txBox="1"/>
-          <p:nvPr/>
-        </p:nvSpPr>
-        <p:spPr>
-          <a:xfrm>
-            <a:off x="-36928" y="3595753"/>
-            <a:ext cx="8661345" cy="1862048"/>
-          </a:xfrm>
-          <a:prstGeom prst="rect">
-            <a:avLst/>
-          </a:prstGeom>
-          <a:noFill/>
-        </p:spPr>
-        <p:txBody>
-          <a:bodyPr wrap="none" rtlCol="0">
-            <a:spAutoFit/>
-          </a:bodyPr>
-          <a:lstStyle/>
-          <a:p>
-            <a:r>
-              <a:rPr lang="en-US" sz="11500" b="1" spc="-700" dirty="0" err="1" smtClean="0">
-                <a:solidFill>
-                  <a:schemeClr val="bg1"/>
-                </a:solidFill>
-                <a:latin typeface="Arial Black"/>
-                <a:cs typeface="Arial Black"/>
-              </a:rPr>
-              <a:t>Free</a:t>
-            </a:r>
-            <a:r>
-              <a:rPr lang="en-US" sz="11500" b="1" spc="-700" dirty="0" err="1" smtClean="0">
-                <a:solidFill>
-                  <a:srgbClr val="7F7F7F"/>
-                </a:solidFill>
-                <a:latin typeface="Arial Black"/>
-                <a:cs typeface="Arial Black"/>
-              </a:rPr>
-              <a:t>Marker</a:t>
-            </a:r>
-            <a:endParaRPr lang="en-US" sz="6000" b="1" spc="-700" dirty="0">
+            <a:endParaRPr lang="en-US" sz="15000" b="1" spc="-1300" dirty="0">
               <a:solidFill>
                 <a:srgbClr val="7F7F7F"/>
               </a:solidFill>
@@ -41312,8 +41482,8 @@
         </p:nvSpPr>
         <p:spPr>
           <a:xfrm>
-            <a:off x="86165" y="4787977"/>
-            <a:ext cx="5134739" cy="1862048"/>
+            <a:off x="86165" y="3872617"/>
+            <a:ext cx="6417141" cy="2400657"/>
           </a:xfrm>
           <a:prstGeom prst="rect">
             <a:avLst/>
@@ -41327,7 +41497,7 @@
           <a:lstStyle/>
           <a:p>
             <a:r>
-              <a:rPr lang="en-US" sz="11500" b="1" spc="-700" dirty="0" err="1" smtClean="0">
+              <a:rPr lang="en-US" sz="15000" b="1" spc="-1300" dirty="0" err="1" smtClean="0">
                 <a:solidFill>
                   <a:schemeClr val="bg1"/>
                 </a:solidFill>
@@ -41337,7 +41507,7 @@
               <a:t>j</a:t>
             </a:r>
             <a:r>
-              <a:rPr lang="en-US" sz="11500" b="1" spc="-700" dirty="0" err="1" smtClean="0">
+              <a:rPr lang="en-US" sz="15000" b="1" spc="-1300" dirty="0" err="1" smtClean="0">
                 <a:solidFill>
                   <a:srgbClr val="7F7F7F"/>
                 </a:solidFill>
@@ -41346,7 +41516,7 @@
               </a:rPr>
               <a:t>Query</a:t>
             </a:r>
-            <a:endParaRPr lang="en-US" sz="6000" b="1" spc="-700" dirty="0">
+            <a:endParaRPr lang="en-US" sz="15000" b="1" spc="-1300" dirty="0">
               <a:solidFill>
                 <a:srgbClr val="7F7F7F"/>
               </a:solidFill>
@@ -41356,42 +41526,6 @@
           </a:p>
         </p:txBody>
       </p:sp>
-      <p:cxnSp>
-        <p:nvCxnSpPr>
-          <p:cNvPr id="25" name="Straight Connector 24"/>
-          <p:cNvCxnSpPr/>
-          <p:nvPr/>
-        </p:nvCxnSpPr>
-        <p:spPr>
-          <a:xfrm rot="5400000">
-            <a:off x="4669688" y="6115535"/>
-            <a:ext cx="1484930" cy="1588"/>
-          </a:xfrm>
-          <a:prstGeom prst="line">
-            <a:avLst/>
-          </a:prstGeom>
-          <a:ln w="63500">
-            <a:solidFill>
-              <a:schemeClr val="bg1"/>
-            </a:solidFill>
-          </a:ln>
-          <a:effectLst/>
-        </p:spPr>
-        <p:style>
-          <a:lnRef idx="2">
-            <a:schemeClr val="accent1"/>
-          </a:lnRef>
-          <a:fillRef idx="0">
-            <a:schemeClr val="accent1"/>
-          </a:fillRef>
-          <a:effectRef idx="1">
-            <a:schemeClr val="accent1"/>
-          </a:effectRef>
-          <a:fontRef idx="minor">
-            <a:schemeClr val="tx1"/>
-          </a:fontRef>
-        </p:style>
-      </p:cxnSp>
       <p:sp>
         <p:nvSpPr>
           <p:cNvPr id="26" name="Rectangle 25"/>
@@ -41400,8 +41534,8 @@
         </p:nvSpPr>
         <p:spPr>
           <a:xfrm>
-            <a:off x="5661455" y="5373070"/>
-            <a:ext cx="3472776" cy="1477328"/>
+            <a:off x="5802520" y="5766400"/>
+            <a:ext cx="3331711" cy="923330"/>
           </a:xfrm>
           <a:prstGeom prst="rect">
             <a:avLst/>
@@ -41446,6 +41580,11 @@
               </a:rPr>
               <a:t>/</a:t>
             </a:r>
+            <a:endParaRPr lang="en-US" dirty="0" smtClean="0">
+              <a:solidFill>
+                <a:srgbClr val="7F7F7F"/>
+              </a:solidFill>
+            </a:endParaRPr>
           </a:p>
           <a:p>
             <a:pPr algn="r"/>
@@ -41455,15 +41594,7 @@
                   <a:srgbClr val="7F7F7F"/>
                 </a:solidFill>
               </a:rPr>
-              <a:t>http://</a:t>
-            </a:r>
-            <a:r>
-              <a:rPr lang="en-US" dirty="0" smtClean="0">
-                <a:solidFill>
-                  <a:schemeClr val="bg1"/>
-                </a:solidFill>
-              </a:rPr>
-              <a:t>jersey</a:t>
+              <a:t>http</a:t>
             </a:r>
             <a:r>
               <a:rPr lang="en-US" dirty="0" smtClean="0">
@@ -41471,18 +41602,7 @@
                   <a:srgbClr val="7F7F7F"/>
                 </a:solidFill>
               </a:rPr>
-              <a:t>.java.net/</a:t>
-            </a:r>
-          </a:p>
-          <a:p>
-            <a:pPr algn="r"/>
-            <a:r>
-              <a:rPr lang="en-US" dirty="0" smtClean="0">
-                <a:solidFill>
-                  <a:srgbClr val="7F7F7F"/>
-                </a:solidFill>
-              </a:rPr>
-              <a:t>http://</a:t>
+              <a:t>://</a:t>
             </a:r>
             <a:r>
               <a:rPr lang="en-US" dirty="0" err="1" smtClean="0">
@@ -41516,6 +41636,11 @@
               </a:rPr>
               <a:t>/</a:t>
             </a:r>
+            <a:endParaRPr lang="en-US" dirty="0" smtClean="0">
+              <a:solidFill>
+                <a:srgbClr val="7F7F7F"/>
+              </a:solidFill>
+            </a:endParaRPr>
           </a:p>
           <a:p>
             <a:pPr algn="r"/>
@@ -41527,35 +41652,8 @@
                   </a:schemeClr>
                 </a:solidFill>
               </a:rPr>
-              <a:t>http://</a:t>
+              <a:t>http</a:t>
             </a:r>
-            <a:r>
-              <a:rPr lang="en-US" dirty="0" err="1" smtClean="0">
-                <a:solidFill>
-                  <a:srgbClr val="FFFFFF"/>
-                </a:solidFill>
-              </a:rPr>
-              <a:t>freemarker</a:t>
-            </a:r>
-            <a:r>
-              <a:rPr lang="en-US" dirty="0" err="1" smtClean="0">
-                <a:solidFill>
-                  <a:srgbClr val="7F7F7F"/>
-                </a:solidFill>
-              </a:rPr>
-              <a:t>.sourceforge.net</a:t>
-            </a:r>
-            <a:r>
-              <a:rPr lang="en-US" dirty="0" smtClean="0">
-                <a:solidFill>
-                  <a:srgbClr val="7F7F7F"/>
-                </a:solidFill>
-              </a:rPr>
-              <a:t>/</a:t>
-            </a:r>
-          </a:p>
-          <a:p>
-            <a:pPr algn="r"/>
             <a:r>
               <a:rPr lang="en-US" dirty="0" smtClean="0">
                 <a:solidFill>
@@ -41564,7 +41662,7 @@
                   </a:schemeClr>
                 </a:solidFill>
               </a:rPr>
-              <a:t>http://</a:t>
+              <a:t>://</a:t>
             </a:r>
             <a:r>
               <a:rPr lang="en-US" dirty="0" smtClean="0">
@@ -41585,6 +41683,51 @@
           </a:p>
         </p:txBody>
       </p:sp>
+      <p:sp>
+        <p:nvSpPr>
+          <p:cNvPr id="9" name="Rectangle 8"/>
+          <p:cNvSpPr/>
+          <p:nvPr/>
+        </p:nvSpPr>
+        <p:spPr>
+          <a:xfrm>
+            <a:off x="2992868" y="717412"/>
+            <a:ext cx="6237605" cy="2400657"/>
+          </a:xfrm>
+          <a:prstGeom prst="rect">
+            <a:avLst/>
+          </a:prstGeom>
+        </p:spPr>
+        <p:txBody>
+          <a:bodyPr wrap="none">
+            <a:spAutoFit/>
+          </a:bodyPr>
+          <a:lstStyle/>
+          <a:p>
+            <a:r>
+              <a:rPr lang="en-US" sz="15000" b="1" spc="-1300" dirty="0" smtClean="0">
+                <a:solidFill>
+                  <a:schemeClr val="bg1">
+                    <a:lumMod val="50000"/>
+                  </a:schemeClr>
+                </a:solidFill>
+                <a:latin typeface="Arial Black"/>
+                <a:cs typeface="Arial Black"/>
+              </a:rPr>
+              <a:t>wizard</a:t>
+            </a:r>
+            <a:endParaRPr lang="en-US" sz="15000" b="1" spc="-1300" dirty="0">
+              <a:solidFill>
+                <a:schemeClr val="bg1">
+                  <a:lumMod val="50000"/>
+                </a:schemeClr>
+              </a:solidFill>
+              <a:latin typeface="Arial Black"/>
+              <a:cs typeface="Arial Black"/>
+            </a:endParaRPr>
+          </a:p>
+        </p:txBody>
+      </p:sp>
     </p:spTree>
   </p:cSld>
   <p:clrMapOvr>
@@ -41601,6 +41744,388 @@
 </file>
 
 <file path=ppt/slides/slide6.xml><?xml version="1.0" encoding="utf-8"?>
+<p:sld xmlns:a="http://schemas.openxmlformats.org/drawingml/2006/main" xmlns:r="http://schemas.openxmlformats.org/officeDocument/2006/relationships" xmlns:mc="http://schemas.openxmlformats.org/markup-compatibility/2006" xmlns:mv="urn:schemas-microsoft-com:mac:vml" xmlns:p="http://schemas.openxmlformats.org/presentationml/2006/main" mc:Ignorable="mv" mc:PreserveAttributes="mv:*">
+  <p:cSld>
+    <p:spTree>
+      <p:nvGrpSpPr>
+        <p:cNvPr id="1" name=""/>
+        <p:cNvGrpSpPr/>
+        <p:nvPr/>
+      </p:nvGrpSpPr>
+      <p:grpSpPr>
+        <a:xfrm>
+          <a:off x="0" y="0"/>
+          <a:ext cx="0" cy="0"/>
+          <a:chOff x="0" y="0"/>
+          <a:chExt cx="0" cy="0"/>
+        </a:xfrm>
+      </p:grpSpPr>
+      <p:sp>
+        <p:nvSpPr>
+          <p:cNvPr id="4" name="TextBox 3"/>
+          <p:cNvSpPr txBox="1"/>
+          <p:nvPr/>
+        </p:nvSpPr>
+        <p:spPr>
+          <a:xfrm>
+            <a:off x="-72074" y="-209082"/>
+            <a:ext cx="9196172" cy="2015936"/>
+          </a:xfrm>
+          <a:prstGeom prst="rect">
+            <a:avLst/>
+          </a:prstGeom>
+          <a:noFill/>
+        </p:spPr>
+        <p:txBody>
+          <a:bodyPr wrap="none" rtlCol="0">
+            <a:spAutoFit/>
+          </a:bodyPr>
+          <a:lstStyle/>
+          <a:p>
+            <a:r>
+              <a:rPr lang="en-US" sz="12500" b="1" spc="-700" dirty="0" err="1" smtClean="0">
+                <a:solidFill>
+                  <a:schemeClr val="bg1"/>
+                </a:solidFill>
+                <a:latin typeface="Arial Black"/>
+                <a:cs typeface="Arial Black"/>
+              </a:rPr>
+              <a:t>Drop</a:t>
+            </a:r>
+            <a:r>
+              <a:rPr lang="en-US" sz="12500" b="1" spc="-700" dirty="0" err="1" smtClean="0">
+                <a:solidFill>
+                  <a:schemeClr val="bg1">
+                    <a:lumMod val="50000"/>
+                  </a:schemeClr>
+                </a:solidFill>
+                <a:latin typeface="Arial Black"/>
+                <a:cs typeface="Arial Black"/>
+              </a:rPr>
+              <a:t>wizard</a:t>
+            </a:r>
+            <a:endParaRPr lang="en-US" sz="12500" b="1" spc="-700" dirty="0">
+              <a:solidFill>
+                <a:schemeClr val="bg1">
+                  <a:lumMod val="50000"/>
+                </a:schemeClr>
+              </a:solidFill>
+              <a:latin typeface="Arial Black"/>
+              <a:cs typeface="Arial Black"/>
+            </a:endParaRPr>
+          </a:p>
+        </p:txBody>
+      </p:sp>
+      <p:sp>
+        <p:nvSpPr>
+          <p:cNvPr id="17" name="TextBox 16"/>
+          <p:cNvSpPr txBox="1"/>
+          <p:nvPr/>
+        </p:nvSpPr>
+        <p:spPr>
+          <a:xfrm>
+            <a:off x="2834336" y="2466585"/>
+            <a:ext cx="3890809" cy="1446550"/>
+          </a:xfrm>
+          <a:prstGeom prst="rect">
+            <a:avLst/>
+          </a:prstGeom>
+          <a:noFill/>
+        </p:spPr>
+        <p:txBody>
+          <a:bodyPr wrap="none" rtlCol="0">
+            <a:spAutoFit/>
+          </a:bodyPr>
+          <a:lstStyle/>
+          <a:p>
+            <a:r>
+              <a:rPr lang="en-US" sz="8800" b="1" spc="-700" dirty="0" smtClean="0">
+                <a:solidFill>
+                  <a:srgbClr val="A6A6A6"/>
+                </a:solidFill>
+                <a:latin typeface="Arial Black"/>
+                <a:cs typeface="Arial Black"/>
+              </a:rPr>
+              <a:t>Jersey</a:t>
+            </a:r>
+            <a:endParaRPr lang="en-US" sz="2800" b="1" spc="-700" dirty="0">
+              <a:solidFill>
+                <a:srgbClr val="A6A6A6"/>
+              </a:solidFill>
+              <a:latin typeface="Arial Black"/>
+              <a:cs typeface="Arial Black"/>
+            </a:endParaRPr>
+          </a:p>
+        </p:txBody>
+      </p:sp>
+      <p:sp>
+        <p:nvSpPr>
+          <p:cNvPr id="20" name="TextBox 19"/>
+          <p:cNvSpPr txBox="1"/>
+          <p:nvPr/>
+        </p:nvSpPr>
+        <p:spPr>
+          <a:xfrm>
+            <a:off x="2780079" y="1519340"/>
+            <a:ext cx="6468437" cy="1446550"/>
+          </a:xfrm>
+          <a:prstGeom prst="rect">
+            <a:avLst/>
+          </a:prstGeom>
+          <a:noFill/>
+        </p:spPr>
+        <p:txBody>
+          <a:bodyPr wrap="none" rtlCol="0">
+            <a:spAutoFit/>
+          </a:bodyPr>
+          <a:lstStyle/>
+          <a:p>
+            <a:r>
+              <a:rPr lang="en-US" sz="8800" b="1" spc="-700" dirty="0" err="1" smtClean="0">
+                <a:solidFill>
+                  <a:srgbClr val="A6A6A6"/>
+                </a:solidFill>
+                <a:latin typeface="Arial Black"/>
+                <a:cs typeface="Arial Black"/>
+              </a:rPr>
+              <a:t>FreeMarker</a:t>
+            </a:r>
+            <a:endParaRPr lang="en-US" sz="4800" b="1" spc="-700" dirty="0">
+              <a:solidFill>
+                <a:srgbClr val="A6A6A6"/>
+              </a:solidFill>
+              <a:latin typeface="Arial Black"/>
+              <a:cs typeface="Arial Black"/>
+            </a:endParaRPr>
+          </a:p>
+        </p:txBody>
+      </p:sp>
+      <p:sp>
+        <p:nvSpPr>
+          <p:cNvPr id="9" name="TextBox 8"/>
+          <p:cNvSpPr txBox="1"/>
+          <p:nvPr/>
+        </p:nvSpPr>
+        <p:spPr>
+          <a:xfrm>
+            <a:off x="-57205" y="1818296"/>
+            <a:ext cx="3005951" cy="1446550"/>
+          </a:xfrm>
+          <a:prstGeom prst="rect">
+            <a:avLst/>
+          </a:prstGeom>
+          <a:noFill/>
+        </p:spPr>
+        <p:txBody>
+          <a:bodyPr wrap="none" rtlCol="0">
+            <a:spAutoFit/>
+          </a:bodyPr>
+          <a:lstStyle/>
+          <a:p>
+            <a:r>
+              <a:rPr lang="en-US" sz="8800" b="1" spc="-700" dirty="0" smtClean="0">
+                <a:solidFill>
+                  <a:srgbClr val="A6A6A6"/>
+                </a:solidFill>
+                <a:latin typeface="Arial Black"/>
+                <a:cs typeface="Arial Black"/>
+              </a:rPr>
+              <a:t>Jetty</a:t>
+            </a:r>
+            <a:endParaRPr lang="en-US" sz="2800" b="1" spc="-700" dirty="0">
+              <a:solidFill>
+                <a:srgbClr val="A6A6A6"/>
+              </a:solidFill>
+              <a:latin typeface="Arial Black"/>
+              <a:cs typeface="Arial Black"/>
+            </a:endParaRPr>
+          </a:p>
+        </p:txBody>
+      </p:sp>
+      <p:sp>
+        <p:nvSpPr>
+          <p:cNvPr id="10" name="TextBox 9"/>
+          <p:cNvSpPr txBox="1"/>
+          <p:nvPr/>
+        </p:nvSpPr>
+        <p:spPr>
+          <a:xfrm>
+            <a:off x="-142017" y="3275629"/>
+            <a:ext cx="4762842" cy="1446550"/>
+          </a:xfrm>
+          <a:prstGeom prst="rect">
+            <a:avLst/>
+          </a:prstGeom>
+          <a:noFill/>
+        </p:spPr>
+        <p:txBody>
+          <a:bodyPr wrap="none" rtlCol="0">
+            <a:spAutoFit/>
+          </a:bodyPr>
+          <a:lstStyle/>
+          <a:p>
+            <a:r>
+              <a:rPr lang="en-US" sz="8800" b="1" spc="-700" dirty="0" smtClean="0">
+                <a:solidFill>
+                  <a:srgbClr val="A6A6A6"/>
+                </a:solidFill>
+                <a:latin typeface="Arial Black"/>
+                <a:cs typeface="Arial Black"/>
+              </a:rPr>
+              <a:t>Jackson</a:t>
+            </a:r>
+            <a:endParaRPr lang="en-US" sz="2800" b="1" spc="-700" dirty="0">
+              <a:solidFill>
+                <a:srgbClr val="A6A6A6"/>
+              </a:solidFill>
+              <a:latin typeface="Arial Black"/>
+              <a:cs typeface="Arial Black"/>
+            </a:endParaRPr>
+          </a:p>
+        </p:txBody>
+      </p:sp>
+      <p:sp>
+        <p:nvSpPr>
+          <p:cNvPr id="11" name="TextBox 10"/>
+          <p:cNvSpPr txBox="1"/>
+          <p:nvPr/>
+        </p:nvSpPr>
+        <p:spPr>
+          <a:xfrm>
+            <a:off x="4723794" y="3493027"/>
+            <a:ext cx="4262705" cy="1446550"/>
+          </a:xfrm>
+          <a:prstGeom prst="rect">
+            <a:avLst/>
+          </a:prstGeom>
+          <a:noFill/>
+        </p:spPr>
+        <p:txBody>
+          <a:bodyPr wrap="none" rtlCol="0">
+            <a:spAutoFit/>
+          </a:bodyPr>
+          <a:lstStyle/>
+          <a:p>
+            <a:r>
+              <a:rPr lang="en-US" sz="8800" b="1" spc="-700" dirty="0" smtClean="0">
+                <a:solidFill>
+                  <a:srgbClr val="A6A6A6"/>
+                </a:solidFill>
+                <a:latin typeface="Arial Black"/>
+                <a:cs typeface="Arial Black"/>
+              </a:rPr>
+              <a:t>Metrics</a:t>
+            </a:r>
+            <a:endParaRPr lang="en-US" sz="2800" b="1" spc="-700" dirty="0">
+              <a:solidFill>
+                <a:srgbClr val="A6A6A6"/>
+              </a:solidFill>
+              <a:latin typeface="Arial Black"/>
+              <a:cs typeface="Arial Black"/>
+            </a:endParaRPr>
+          </a:p>
+        </p:txBody>
+      </p:sp>
+      <p:sp>
+        <p:nvSpPr>
+          <p:cNvPr id="13" name="TextBox 12"/>
+          <p:cNvSpPr txBox="1"/>
+          <p:nvPr/>
+        </p:nvSpPr>
+        <p:spPr>
+          <a:xfrm>
+            <a:off x="5031066" y="5420141"/>
+            <a:ext cx="3685624" cy="1446550"/>
+          </a:xfrm>
+          <a:prstGeom prst="rect">
+            <a:avLst/>
+          </a:prstGeom>
+          <a:noFill/>
+        </p:spPr>
+        <p:txBody>
+          <a:bodyPr wrap="none" rtlCol="0">
+            <a:spAutoFit/>
+          </a:bodyPr>
+          <a:lstStyle/>
+          <a:p>
+            <a:r>
+              <a:rPr lang="en-US" sz="8800" b="1" spc="-700" dirty="0" smtClean="0">
+                <a:solidFill>
+                  <a:srgbClr val="A6A6A6"/>
+                </a:solidFill>
+                <a:latin typeface="Arial Black"/>
+                <a:cs typeface="Arial Black"/>
+              </a:rPr>
+              <a:t>Guava</a:t>
+            </a:r>
+            <a:endParaRPr lang="en-US" sz="2800" b="1" spc="-700" dirty="0">
+              <a:solidFill>
+                <a:srgbClr val="A6A6A6"/>
+              </a:solidFill>
+              <a:latin typeface="Arial Black"/>
+              <a:cs typeface="Arial Black"/>
+            </a:endParaRPr>
+          </a:p>
+        </p:txBody>
+      </p:sp>
+      <p:sp>
+        <p:nvSpPr>
+          <p:cNvPr id="14" name="TextBox 13"/>
+          <p:cNvSpPr txBox="1"/>
+          <p:nvPr/>
+        </p:nvSpPr>
+        <p:spPr>
+          <a:xfrm>
+            <a:off x="-57205" y="4504781"/>
+            <a:ext cx="7237879" cy="1446550"/>
+          </a:xfrm>
+          <a:prstGeom prst="rect">
+            <a:avLst/>
+          </a:prstGeom>
+          <a:noFill/>
+        </p:spPr>
+        <p:txBody>
+          <a:bodyPr wrap="none" rtlCol="0">
+            <a:spAutoFit/>
+          </a:bodyPr>
+          <a:lstStyle/>
+          <a:p>
+            <a:r>
+              <a:rPr lang="en-US" sz="8800" b="1" spc="-700" dirty="0" smtClean="0">
+                <a:solidFill>
+                  <a:srgbClr val="A6A6A6"/>
+                </a:solidFill>
+                <a:latin typeface="Arial Black"/>
+                <a:cs typeface="Arial Black"/>
+              </a:rPr>
+              <a:t>Logback/slf4j</a:t>
+            </a:r>
+            <a:endParaRPr lang="en-US" sz="2800" b="1" spc="-700" dirty="0">
+              <a:solidFill>
+                <a:srgbClr val="A6A6A6"/>
+              </a:solidFill>
+              <a:latin typeface="Arial Black"/>
+              <a:cs typeface="Arial Black"/>
+            </a:endParaRPr>
+          </a:p>
+        </p:txBody>
+      </p:sp>
+    </p:spTree>
+  </p:cSld>
+  <p:clrMapOvr>
+    <a:masterClrMapping/>
+  </p:clrMapOvr>
+  <p:timing>
+    <p:tnLst>
+      <p:par>
+        <p:cTn id="1" dur="indefinite" restart="never" nodeType="tmRoot"/>
+      </p:par>
+    </p:tnLst>
+  </p:timing>
+</p:sld>
+</file>
+
+<file path=ppt/slides/slide7.xml><?xml version="1.0" encoding="utf-8"?>
 <p:sld xmlns:a="http://schemas.openxmlformats.org/drawingml/2006/main" xmlns:r="http://schemas.openxmlformats.org/officeDocument/2006/relationships" xmlns:mc="http://schemas.openxmlformats.org/markup-compatibility/2006" xmlns:mv="urn:schemas-microsoft-com:mac:vml" xmlns:p="http://schemas.openxmlformats.org/presentationml/2006/main" mc:Ignorable="mv" mc:PreserveAttributes="mv:*">
   <p:cSld>
     <p:spTree>
@@ -42340,7 +42865,7 @@
 </p:sld>
 </file>
 
-<file path=ppt/slides/slide7.xml><?xml version="1.0" encoding="utf-8"?>
+<file path=ppt/slides/slide8.xml><?xml version="1.0" encoding="utf-8"?>
 <p:sld xmlns:a="http://schemas.openxmlformats.org/drawingml/2006/main" xmlns:r="http://schemas.openxmlformats.org/officeDocument/2006/relationships" xmlns:mc="http://schemas.openxmlformats.org/markup-compatibility/2006" xmlns:mv="urn:schemas-microsoft-com:mac:vml" xmlns:p="http://schemas.openxmlformats.org/presentationml/2006/main" mc:Ignorable="mv" mc:PreserveAttributes="mv:*">
   <p:cSld>
     <p:spTree>
@@ -42406,7 +42931,7 @@
         <p:spPr>
           <a:xfrm>
             <a:off x="245422" y="1716288"/>
-            <a:ext cx="8395297" cy="1384995"/>
+            <a:ext cx="6340272" cy="523220"/>
           </a:xfrm>
           <a:prstGeom prst="rect">
             <a:avLst/>
@@ -42423,7 +42948,7 @@
             <a:r>
               <a:rPr lang="en-US" sz="2800" dirty="0" smtClean="0">
                 <a:solidFill>
-                  <a:srgbClr val="FFFFFF"/>
+                  <a:srgbClr val="A6A6A6"/>
                 </a:solidFill>
               </a:rPr>
               <a:t>Work in </a:t>
@@ -42431,74 +42956,32 @@
             <a:r>
               <a:rPr lang="en-US" sz="2800" b="1" dirty="0" smtClean="0">
                 <a:solidFill>
-                  <a:srgbClr val="A6A6A6"/>
+                  <a:srgbClr val="EEECE1"/>
                 </a:solidFill>
               </a:rPr>
-              <a:t>pairs</a:t>
-            </a:r>
-            <a:r>
-              <a:rPr lang="en-US" sz="2800" b="1" dirty="0" smtClean="0">
-                <a:solidFill>
-                  <a:srgbClr val="FFFFFF"/>
-                </a:solidFill>
-              </a:rPr>
-              <a:t> </a:t>
+              <a:t>pairs </a:t>
             </a:r>
             <a:r>
               <a:rPr lang="en-US" sz="2800" dirty="0" smtClean="0">
                 <a:solidFill>
-                  <a:srgbClr val="FFFFFF"/>
+                  <a:srgbClr val="A6A6A6"/>
                 </a:solidFill>
               </a:rPr>
-              <a:t>(1 laptop between 2 people)</a:t>
+              <a:t>(1 laptop between 2 people</a:t>
             </a:r>
-          </a:p>
-          <a:p>
-            <a:pPr marL="342900" indent="-342900"/>
             <a:r>
               <a:rPr lang="en-US" sz="2800" dirty="0" smtClean="0">
                 <a:solidFill>
-                  <a:srgbClr val="FFFFFF"/>
+                  <a:srgbClr val="A6A6A6"/>
                 </a:solidFill>
               </a:rPr>
-              <a:t>See </a:t>
+              <a:t>)</a:t>
             </a:r>
-            <a:r>
-              <a:rPr lang="en-US" sz="2800" b="1" dirty="0" smtClean="0">
-                <a:solidFill>
-                  <a:schemeClr val="bg1">
-                    <a:lumMod val="65000"/>
-                  </a:schemeClr>
-                </a:solidFill>
-              </a:rPr>
-              <a:t>http://</a:t>
-            </a:r>
-            <a:r>
-              <a:rPr lang="en-US" sz="2800" b="1" dirty="0" err="1" smtClean="0">
-                <a:solidFill>
-                  <a:schemeClr val="bg1">
-                    <a:lumMod val="65000"/>
-                  </a:schemeClr>
-                </a:solidFill>
-              </a:rPr>
-              <a:t>davidmorgantini.blogspot.co.uk/somepage</a:t>
-            </a:r>
-            <a:endParaRPr lang="en-US" sz="2800" b="1" dirty="0" smtClean="0">
-              <a:solidFill>
-                <a:srgbClr val="FFFFFF"/>
+            <a:endParaRPr lang="en-US" sz="2800" dirty="0" smtClean="0">
+              <a:solidFill>
+                <a:srgbClr val="A6A6A6"/>
               </a:solidFill>
             </a:endParaRPr>
-          </a:p>
-          <a:p>
-            <a:pPr marL="342900" indent="-342900"/>
-            <a:r>
-              <a:rPr lang="en-US" sz="2800" dirty="0" smtClean="0">
-                <a:solidFill>
-                  <a:srgbClr val="FFFFFF"/>
-                </a:solidFill>
-              </a:rPr>
-              <a:t>for instructions</a:t>
-            </a:r>
           </a:p>
         </p:txBody>
       </p:sp>
@@ -42510,7 +42993,7 @@
         </p:nvSpPr>
         <p:spPr>
           <a:xfrm>
-            <a:off x="1458136" y="3741508"/>
+            <a:off x="245422" y="3279843"/>
             <a:ext cx="5865708" cy="461665"/>
           </a:xfrm>
           <a:prstGeom prst="rect">
@@ -42527,7 +43010,9 @@
             <a:r>
               <a:rPr lang="en-US" sz="2400" dirty="0" err="1" smtClean="0">
                 <a:solidFill>
-                  <a:schemeClr val="bg1"/>
+                  <a:schemeClr val="bg1">
+                    <a:lumMod val="65000"/>
+                  </a:schemeClr>
                 </a:solidFill>
               </a:rPr>
               <a:t>Github</a:t>
@@ -42535,7 +43020,9 @@
             <a:r>
               <a:rPr lang="en-US" sz="2400" dirty="0" smtClean="0">
                 <a:solidFill>
-                  <a:schemeClr val="bg1"/>
+                  <a:schemeClr val="bg1">
+                    <a:lumMod val="65000"/>
+                  </a:schemeClr>
                 </a:solidFill>
               </a:rPr>
               <a:t>: </a:t>
@@ -42543,18 +43030,14 @@
             <a:r>
               <a:rPr lang="en-US" sz="2400" b="1" dirty="0" err="1" smtClean="0">
                 <a:solidFill>
-                  <a:schemeClr val="bg1">
-                    <a:lumMod val="65000"/>
-                  </a:schemeClr>
+                  <a:schemeClr val="bg2"/>
                 </a:solidFill>
               </a:rPr>
               <a:t>git@github.com:akash/story-wall.git</a:t>
             </a:r>
             <a:endParaRPr lang="en-US" sz="2400" b="1" dirty="0" smtClean="0">
               <a:solidFill>
-                <a:schemeClr val="bg1">
-                  <a:lumMod val="65000"/>
-                </a:schemeClr>
+                <a:schemeClr val="bg2"/>
               </a:solidFill>
             </a:endParaRPr>
           </a:p>
@@ -42575,7 +43058,7 @@
 </p:sld>
 </file>
 
-<file path=ppt/slides/slide8.xml><?xml version="1.0" encoding="utf-8"?>
+<file path=ppt/slides/slide9.xml><?xml version="1.0" encoding="utf-8"?>
 <p:sld xmlns:a="http://schemas.openxmlformats.org/drawingml/2006/main" xmlns:r="http://schemas.openxmlformats.org/officeDocument/2006/relationships" xmlns:mc="http://schemas.openxmlformats.org/markup-compatibility/2006" xmlns:mv="urn:schemas-microsoft-com:mac:vml" xmlns:p="http://schemas.openxmlformats.org/presentationml/2006/main" mc:Ignorable="mv" mc:PreserveAttributes="mv:*">
   <p:cSld>
     <p:spTree>
@@ -42715,211 +43198,6 @@
               </a:solidFill>
               <a:latin typeface="Arial Black"/>
               <a:cs typeface="Arial Black"/>
-            </a:endParaRPr>
-          </a:p>
-        </p:txBody>
-      </p:sp>
-    </p:spTree>
-  </p:cSld>
-  <p:clrMapOvr>
-    <a:masterClrMapping/>
-  </p:clrMapOvr>
-  <p:timing>
-    <p:tnLst>
-      <p:par>
-        <p:cTn id="1" dur="indefinite" restart="never" nodeType="tmRoot"/>
-      </p:par>
-    </p:tnLst>
-  </p:timing>
-</p:sld>
-</file>
-
-<file path=ppt/slides/slide9.xml><?xml version="1.0" encoding="utf-8"?>
-<p:sld xmlns:a="http://schemas.openxmlformats.org/drawingml/2006/main" xmlns:r="http://schemas.openxmlformats.org/officeDocument/2006/relationships" xmlns:mc="http://schemas.openxmlformats.org/markup-compatibility/2006" xmlns:mv="urn:schemas-microsoft-com:mac:vml" xmlns:p="http://schemas.openxmlformats.org/presentationml/2006/main" mc:Ignorable="mv" mc:PreserveAttributes="mv:*">
-  <p:cSld>
-    <p:spTree>
-      <p:nvGrpSpPr>
-        <p:cNvPr id="1" name=""/>
-        <p:cNvGrpSpPr/>
-        <p:nvPr/>
-      </p:nvGrpSpPr>
-      <p:grpSpPr>
-        <a:xfrm>
-          <a:off x="0" y="0"/>
-          <a:ext cx="0" cy="0"/>
-          <a:chOff x="0" y="0"/>
-          <a:chExt cx="0" cy="0"/>
-        </a:xfrm>
-      </p:grpSpPr>
-      <p:sp>
-        <p:nvSpPr>
-          <p:cNvPr id="2" name="TextBox 1"/>
-          <p:cNvSpPr txBox="1"/>
-          <p:nvPr/>
-        </p:nvSpPr>
-        <p:spPr>
-          <a:xfrm>
-            <a:off x="-148733" y="899286"/>
-            <a:ext cx="6519734" cy="2646878"/>
-          </a:xfrm>
-          <a:prstGeom prst="rect">
-            <a:avLst/>
-          </a:prstGeom>
-          <a:noFill/>
-        </p:spPr>
-        <p:txBody>
-          <a:bodyPr wrap="none" rtlCol="0">
-            <a:spAutoFit/>
-          </a:bodyPr>
-          <a:lstStyle/>
-          <a:p>
-            <a:r>
-              <a:rPr lang="en-US" sz="16400" b="1" spc="-2000" dirty="0" smtClean="0">
-                <a:solidFill>
-                  <a:schemeClr val="bg1"/>
-                </a:solidFill>
-                <a:latin typeface="Arial Black"/>
-                <a:cs typeface="Arial Black"/>
-              </a:rPr>
-              <a:t>Maven</a:t>
-            </a:r>
-          </a:p>
-        </p:txBody>
-      </p:sp>
-      <p:sp>
-        <p:nvSpPr>
-          <p:cNvPr id="3" name="TextBox 2"/>
-          <p:cNvSpPr txBox="1"/>
-          <p:nvPr/>
-        </p:nvSpPr>
-        <p:spPr>
-          <a:xfrm>
-            <a:off x="-109823" y="2560478"/>
-            <a:ext cx="3018775" cy="2616101"/>
-          </a:xfrm>
-          <a:prstGeom prst="rect">
-            <a:avLst/>
-          </a:prstGeom>
-          <a:noFill/>
-        </p:spPr>
-        <p:txBody>
-          <a:bodyPr wrap="none" rtlCol="0">
-            <a:spAutoFit/>
-          </a:bodyPr>
-          <a:lstStyle/>
-          <a:p>
-            <a:r>
-              <a:rPr lang="en-US" sz="16400" b="1" spc="-2000" dirty="0" err="1" smtClean="0">
-                <a:solidFill>
-                  <a:schemeClr val="bg1">
-                    <a:lumMod val="65000"/>
-                  </a:schemeClr>
-                </a:solidFill>
-                <a:latin typeface="Arial Black"/>
-                <a:cs typeface="Arial Black"/>
-              </a:rPr>
-              <a:t>Git</a:t>
-            </a:r>
-            <a:endParaRPr lang="en-US" sz="16400" b="1" spc="-2000" dirty="0" smtClean="0">
-              <a:solidFill>
-                <a:schemeClr val="bg1">
-                  <a:lumMod val="65000"/>
-                </a:schemeClr>
-              </a:solidFill>
-              <a:latin typeface="Arial Black"/>
-              <a:cs typeface="Arial Black"/>
-            </a:endParaRPr>
-          </a:p>
-        </p:txBody>
-      </p:sp>
-      <p:sp>
-        <p:nvSpPr>
-          <p:cNvPr id="4" name="TextBox 3"/>
-          <p:cNvSpPr txBox="1"/>
-          <p:nvPr/>
-        </p:nvSpPr>
-        <p:spPr>
-          <a:xfrm>
-            <a:off x="-155587" y="4190279"/>
-            <a:ext cx="9571851" cy="2646878"/>
-          </a:xfrm>
-          <a:prstGeom prst="rect">
-            <a:avLst/>
-          </a:prstGeom>
-          <a:noFill/>
-        </p:spPr>
-        <p:txBody>
-          <a:bodyPr wrap="none" rtlCol="0">
-            <a:spAutoFit/>
-          </a:bodyPr>
-          <a:lstStyle/>
-          <a:p>
-            <a:r>
-              <a:rPr lang="en-US" sz="16400" b="1" spc="-2000" dirty="0" err="1" smtClean="0">
-                <a:solidFill>
-                  <a:schemeClr val="bg1">
-                    <a:lumMod val="65000"/>
-                  </a:schemeClr>
-                </a:solidFill>
-                <a:latin typeface="Arial Black"/>
-                <a:cs typeface="Arial Black"/>
-              </a:rPr>
-              <a:t>MongoDB</a:t>
-            </a:r>
-            <a:endParaRPr lang="en-US" sz="16400" b="1" spc="-2000" dirty="0">
-              <a:solidFill>
-                <a:schemeClr val="bg1">
-                  <a:lumMod val="65000"/>
-                </a:schemeClr>
-              </a:solidFill>
-              <a:latin typeface="Arial Black"/>
-              <a:cs typeface="Arial Black"/>
-            </a:endParaRPr>
-          </a:p>
-        </p:txBody>
-      </p:sp>
-      <p:sp>
-        <p:nvSpPr>
-          <p:cNvPr id="6" name="Rectangle 5"/>
-          <p:cNvSpPr/>
-          <p:nvPr/>
-        </p:nvSpPr>
-        <p:spPr>
-          <a:xfrm>
-            <a:off x="-544323" y="378760"/>
-            <a:ext cx="9253823" cy="523220"/>
-          </a:xfrm>
-          <a:prstGeom prst="rect">
-            <a:avLst/>
-          </a:prstGeom>
-        </p:spPr>
-        <p:txBody>
-          <a:bodyPr wrap="square">
-            <a:spAutoFit/>
-          </a:bodyPr>
-          <a:lstStyle/>
-          <a:p>
-            <a:pPr marL="514350" indent="-514350"/>
-            <a:r>
-              <a:rPr lang="en-US" sz="2800" b="1" dirty="0" smtClean="0">
-                <a:solidFill>
-                  <a:srgbClr val="FFFFFF"/>
-                </a:solidFill>
-              </a:rPr>
-              <a:t>	http://</a:t>
-            </a:r>
-            <a:r>
-              <a:rPr lang="en-US" sz="2800" b="1" dirty="0" err="1" smtClean="0">
-                <a:solidFill>
-                  <a:srgbClr val="FFFFFF"/>
-                </a:solidFill>
-              </a:rPr>
-              <a:t>maven.apache.org/download.html#Installation</a:t>
-            </a:r>
-            <a:endParaRPr lang="en-US" sz="2800" b="1" dirty="0" smtClean="0">
-              <a:solidFill>
-                <a:srgbClr val="FFFFFF"/>
-              </a:solidFill>
             </a:endParaRPr>
           </a:p>
         </p:txBody>

</xml_diff>